<commit_message>
CleverDict has its own Cartoon!
</commit_message>
<xml_diff>
--- a/cleverdict.pptx
+++ b/cleverdict.pptx
@@ -7,6 +7,9 @@
   <p:sldIdLst>
     <p:sldId id="256" r:id="rId2"/>
     <p:sldId id="257" r:id="rId3"/>
+    <p:sldId id="261" r:id="rId4"/>
+    <p:sldId id="262" r:id="rId5"/>
+    <p:sldId id="263" r:id="rId6"/>
   </p:sldIdLst>
   <p:sldSz cx="12192000" cy="6858000"/>
   <p:notesSz cx="6858000" cy="9144000"/>
@@ -116,13 +119,264 @@
 <file path=ppt/revisionInfo.xml><?xml version="1.0" encoding="utf-8"?>
 <p1510:revInfo xmlns:a="http://schemas.openxmlformats.org/drawingml/2006/main" xmlns:r="http://schemas.openxmlformats.org/officeDocument/2006/relationships" xmlns:p1510="http://schemas.microsoft.com/office/powerpoint/2015/10/main">
   <p1510:revLst>
-    <p1510:client id="{22B001C6-88E7-41D7-A943-5A5CD60088F3}" v="6" dt="2020-12-13T17:09:45.894"/>
+    <p1510:client id="{A4CD6E9A-18C3-4F43-9F4A-6EB9A7A6C9AA}" v="23" dt="2021-01-24T14:40:30.715"/>
   </p1510:revLst>
 </p1510:revInfo>
 </file>
 
 <file path=ppt/changesInfos/changesInfo1.xml><?xml version="1.0" encoding="utf-8"?>
 <pc:chgInfo xmlns:a="http://schemas.openxmlformats.org/drawingml/2006/main" xmlns:r="http://schemas.openxmlformats.org/officeDocument/2006/relationships" xmlns:ac="http://schemas.microsoft.com/office/drawing/2013/main/command" xmlns:pc="http://schemas.microsoft.com/office/powerpoint/2013/main/command">
+  <pc:docChgLst>
+    <pc:chgData name="Peter Fison" userId="414d6edd842eada8" providerId="LiveId" clId="{A4CD6E9A-18C3-4F43-9F4A-6EB9A7A6C9AA}"/>
+    <pc:docChg chg="undo custSel addSld delSld modSld sldOrd">
+      <pc:chgData name="Peter Fison" userId="414d6edd842eada8" providerId="LiveId" clId="{A4CD6E9A-18C3-4F43-9F4A-6EB9A7A6C9AA}" dt="2021-01-24T14:40:33.513" v="619"/>
+      <pc:docMkLst>
+        <pc:docMk/>
+      </pc:docMkLst>
+      <pc:sldChg chg="addSp delSp modSp new del mod">
+        <pc:chgData name="Peter Fison" userId="414d6edd842eada8" providerId="LiveId" clId="{A4CD6E9A-18C3-4F43-9F4A-6EB9A7A6C9AA}" dt="2021-01-24T14:32:12.825" v="446" actId="47"/>
+        <pc:sldMkLst>
+          <pc:docMk/>
+          <pc:sldMk cId="3505975229" sldId="258"/>
+        </pc:sldMkLst>
+        <pc:spChg chg="add mod">
+          <ac:chgData name="Peter Fison" userId="414d6edd842eada8" providerId="LiveId" clId="{A4CD6E9A-18C3-4F43-9F4A-6EB9A7A6C9AA}" dt="2021-01-24T14:23:51.988" v="363" actId="20577"/>
+          <ac:spMkLst>
+            <pc:docMk/>
+            <pc:sldMk cId="3505975229" sldId="258"/>
+            <ac:spMk id="3" creationId="{F761282A-938E-412E-A4B8-7831DE3E9A20}"/>
+          </ac:spMkLst>
+        </pc:spChg>
+        <pc:spChg chg="add del mod">
+          <ac:chgData name="Peter Fison" userId="414d6edd842eada8" providerId="LiveId" clId="{A4CD6E9A-18C3-4F43-9F4A-6EB9A7A6C9AA}" dt="2021-01-24T14:19:20.317" v="256" actId="478"/>
+          <ac:spMkLst>
+            <pc:docMk/>
+            <pc:sldMk cId="3505975229" sldId="258"/>
+            <ac:spMk id="4" creationId="{D3AD28BF-1C2D-4DCC-AFAD-DDDAD6324CD7}"/>
+          </ac:spMkLst>
+        </pc:spChg>
+        <pc:spChg chg="add mod">
+          <ac:chgData name="Peter Fison" userId="414d6edd842eada8" providerId="LiveId" clId="{A4CD6E9A-18C3-4F43-9F4A-6EB9A7A6C9AA}" dt="2021-01-24T14:24:25.462" v="365" actId="113"/>
+          <ac:spMkLst>
+            <pc:docMk/>
+            <pc:sldMk cId="3505975229" sldId="258"/>
+            <ac:spMk id="5" creationId="{9C4B4E81-B59E-43DB-B744-4712BE0F38FC}"/>
+          </ac:spMkLst>
+        </pc:spChg>
+        <pc:picChg chg="add mod">
+          <ac:chgData name="Peter Fison" userId="414d6edd842eada8" providerId="LiveId" clId="{A4CD6E9A-18C3-4F43-9F4A-6EB9A7A6C9AA}" dt="2021-01-24T14:22:47.287" v="343" actId="1076"/>
+          <ac:picMkLst>
+            <pc:docMk/>
+            <pc:sldMk cId="3505975229" sldId="258"/>
+            <ac:picMk id="2" creationId="{B46493AC-AE8F-4B91-8C0D-0D185605539A}"/>
+          </ac:picMkLst>
+        </pc:picChg>
+        <pc:picChg chg="add mod modCrop">
+          <ac:chgData name="Peter Fison" userId="414d6edd842eada8" providerId="LiveId" clId="{A4CD6E9A-18C3-4F43-9F4A-6EB9A7A6C9AA}" dt="2021-01-24T14:19:59.231" v="262" actId="732"/>
+          <ac:picMkLst>
+            <pc:docMk/>
+            <pc:sldMk cId="3505975229" sldId="258"/>
+            <ac:picMk id="6" creationId="{08FF8133-C348-4AB4-842F-3F73462FD3ED}"/>
+          </ac:picMkLst>
+        </pc:picChg>
+        <pc:picChg chg="add del">
+          <ac:chgData name="Peter Fison" userId="414d6edd842eada8" providerId="LiveId" clId="{A4CD6E9A-18C3-4F43-9F4A-6EB9A7A6C9AA}" dt="2021-01-24T14:25:46.509" v="367" actId="21"/>
+          <ac:picMkLst>
+            <pc:docMk/>
+            <pc:sldMk cId="3505975229" sldId="258"/>
+            <ac:picMk id="7" creationId="{42172A6B-F4FE-4FD2-8B2F-D3DA4A20EA26}"/>
+          </ac:picMkLst>
+        </pc:picChg>
+      </pc:sldChg>
+      <pc:sldChg chg="addSp new del">
+        <pc:chgData name="Peter Fison" userId="414d6edd842eada8" providerId="LiveId" clId="{A4CD6E9A-18C3-4F43-9F4A-6EB9A7A6C9AA}" dt="2021-01-24T14:26:07.820" v="371" actId="47"/>
+        <pc:sldMkLst>
+          <pc:docMk/>
+          <pc:sldMk cId="1771318038" sldId="259"/>
+        </pc:sldMkLst>
+        <pc:picChg chg="add">
+          <ac:chgData name="Peter Fison" userId="414d6edd842eada8" providerId="LiveId" clId="{A4CD6E9A-18C3-4F43-9F4A-6EB9A7A6C9AA}" dt="2021-01-24T14:25:52.041" v="369"/>
+          <ac:picMkLst>
+            <pc:docMk/>
+            <pc:sldMk cId="1771318038" sldId="259"/>
+            <ac:picMk id="2" creationId="{D0D06629-8838-4DCF-B926-D1CA78F77333}"/>
+          </ac:picMkLst>
+        </pc:picChg>
+      </pc:sldChg>
+      <pc:sldChg chg="add del ord">
+        <pc:chgData name="Peter Fison" userId="414d6edd842eada8" providerId="LiveId" clId="{A4CD6E9A-18C3-4F43-9F4A-6EB9A7A6C9AA}" dt="2021-01-24T14:32:08.611" v="445" actId="47"/>
+        <pc:sldMkLst>
+          <pc:docMk/>
+          <pc:sldMk cId="2042285339" sldId="260"/>
+        </pc:sldMkLst>
+      </pc:sldChg>
+      <pc:sldChg chg="addSp delSp modSp add mod ord">
+        <pc:chgData name="Peter Fison" userId="414d6edd842eada8" providerId="LiveId" clId="{A4CD6E9A-18C3-4F43-9F4A-6EB9A7A6C9AA}" dt="2021-01-24T14:39:58.956" v="615" actId="1076"/>
+        <pc:sldMkLst>
+          <pc:docMk/>
+          <pc:sldMk cId="690344040" sldId="261"/>
+        </pc:sldMkLst>
+        <pc:spChg chg="mod">
+          <ac:chgData name="Peter Fison" userId="414d6edd842eada8" providerId="LiveId" clId="{A4CD6E9A-18C3-4F43-9F4A-6EB9A7A6C9AA}" dt="2021-01-24T14:34:38.540" v="521" actId="1038"/>
+          <ac:spMkLst>
+            <pc:docMk/>
+            <pc:sldMk cId="690344040" sldId="261"/>
+            <ac:spMk id="3" creationId="{F761282A-938E-412E-A4B8-7831DE3E9A20}"/>
+          </ac:spMkLst>
+        </pc:spChg>
+        <pc:spChg chg="del mod">
+          <ac:chgData name="Peter Fison" userId="414d6edd842eada8" providerId="LiveId" clId="{A4CD6E9A-18C3-4F43-9F4A-6EB9A7A6C9AA}" dt="2021-01-24T14:38:45.890" v="583" actId="478"/>
+          <ac:spMkLst>
+            <pc:docMk/>
+            <pc:sldMk cId="690344040" sldId="261"/>
+            <ac:spMk id="5" creationId="{9C4B4E81-B59E-43DB-B744-4712BE0F38FC}"/>
+          </ac:spMkLst>
+        </pc:spChg>
+        <pc:spChg chg="add del mod">
+          <ac:chgData name="Peter Fison" userId="414d6edd842eada8" providerId="LiveId" clId="{A4CD6E9A-18C3-4F43-9F4A-6EB9A7A6C9AA}" dt="2021-01-24T14:32:44.291" v="451"/>
+          <ac:spMkLst>
+            <pc:docMk/>
+            <pc:sldMk cId="690344040" sldId="261"/>
+            <ac:spMk id="8" creationId="{259424F2-F2C0-41D6-BB02-7F2E8BBD929E}"/>
+          </ac:spMkLst>
+        </pc:spChg>
+        <pc:spChg chg="add mod">
+          <ac:chgData name="Peter Fison" userId="414d6edd842eada8" providerId="LiveId" clId="{A4CD6E9A-18C3-4F43-9F4A-6EB9A7A6C9AA}" dt="2021-01-24T14:39:25.868" v="599" actId="207"/>
+          <ac:spMkLst>
+            <pc:docMk/>
+            <pc:sldMk cId="690344040" sldId="261"/>
+            <ac:spMk id="11" creationId="{F93EB279-305C-46DD-826A-D2CC7F6B109E}"/>
+          </ac:spMkLst>
+        </pc:spChg>
+        <pc:spChg chg="add del mod">
+          <ac:chgData name="Peter Fison" userId="414d6edd842eada8" providerId="LiveId" clId="{A4CD6E9A-18C3-4F43-9F4A-6EB9A7A6C9AA}" dt="2021-01-24T14:39:07.697" v="587" actId="478"/>
+          <ac:spMkLst>
+            <pc:docMk/>
+            <pc:sldMk cId="690344040" sldId="261"/>
+            <ac:spMk id="17" creationId="{62787EE6-5BD9-43A6-BB90-2725ED39733B}"/>
+          </ac:spMkLst>
+        </pc:spChg>
+        <pc:spChg chg="add mod">
+          <ac:chgData name="Peter Fison" userId="414d6edd842eada8" providerId="LiveId" clId="{A4CD6E9A-18C3-4F43-9F4A-6EB9A7A6C9AA}" dt="2021-01-24T14:39:58.956" v="615" actId="1076"/>
+          <ac:spMkLst>
+            <pc:docMk/>
+            <pc:sldMk cId="690344040" sldId="261"/>
+            <ac:spMk id="18" creationId="{AC0B925E-BB37-4578-82D6-A92656B26848}"/>
+          </ac:spMkLst>
+        </pc:spChg>
+        <pc:picChg chg="mod">
+          <ac:chgData name="Peter Fison" userId="414d6edd842eada8" providerId="LiveId" clId="{A4CD6E9A-18C3-4F43-9F4A-6EB9A7A6C9AA}" dt="2021-01-24T14:34:38.540" v="521" actId="1038"/>
+          <ac:picMkLst>
+            <pc:docMk/>
+            <pc:sldMk cId="690344040" sldId="261"/>
+            <ac:picMk id="2" creationId="{B46493AC-AE8F-4B91-8C0D-0D185605539A}"/>
+          </ac:picMkLst>
+        </pc:picChg>
+        <pc:picChg chg="add del">
+          <ac:chgData name="Peter Fison" userId="414d6edd842eada8" providerId="LiveId" clId="{A4CD6E9A-18C3-4F43-9F4A-6EB9A7A6C9AA}" dt="2021-01-24T14:28:54.263" v="427" actId="21"/>
+          <ac:picMkLst>
+            <pc:docMk/>
+            <pc:sldMk cId="690344040" sldId="261"/>
+            <ac:picMk id="4" creationId="{44C259EA-1B5A-417B-A8DE-7AF09B07F4EB}"/>
+          </ac:picMkLst>
+        </pc:picChg>
+        <pc:picChg chg="del mod">
+          <ac:chgData name="Peter Fison" userId="414d6edd842eada8" providerId="LiveId" clId="{A4CD6E9A-18C3-4F43-9F4A-6EB9A7A6C9AA}" dt="2021-01-24T14:34:51.090" v="526" actId="478"/>
+          <ac:picMkLst>
+            <pc:docMk/>
+            <pc:sldMk cId="690344040" sldId="261"/>
+            <ac:picMk id="6" creationId="{08FF8133-C348-4AB4-842F-3F73462FD3ED}"/>
+          </ac:picMkLst>
+        </pc:picChg>
+        <pc:picChg chg="add mod">
+          <ac:chgData name="Peter Fison" userId="414d6edd842eada8" providerId="LiveId" clId="{A4CD6E9A-18C3-4F43-9F4A-6EB9A7A6C9AA}" dt="2021-01-24T14:34:38.540" v="521" actId="1038"/>
+          <ac:picMkLst>
+            <pc:docMk/>
+            <pc:sldMk cId="690344040" sldId="261"/>
+            <ac:picMk id="7" creationId="{63C1F3E9-22F5-405F-BA85-0A715BE12817}"/>
+          </ac:picMkLst>
+        </pc:picChg>
+        <pc:picChg chg="add del">
+          <ac:chgData name="Peter Fison" userId="414d6edd842eada8" providerId="LiveId" clId="{A4CD6E9A-18C3-4F43-9F4A-6EB9A7A6C9AA}" dt="2021-01-24T14:32:44.290" v="449" actId="478"/>
+          <ac:picMkLst>
+            <pc:docMk/>
+            <pc:sldMk cId="690344040" sldId="261"/>
+            <ac:picMk id="10" creationId="{57C8D0A7-E75C-4DE9-A3F1-32A34AD67621}"/>
+          </ac:picMkLst>
+        </pc:picChg>
+        <pc:picChg chg="add del">
+          <ac:chgData name="Peter Fison" userId="414d6edd842eada8" providerId="LiveId" clId="{A4CD6E9A-18C3-4F43-9F4A-6EB9A7A6C9AA}" dt="2021-01-24T14:34:22.421" v="462"/>
+          <ac:picMkLst>
+            <pc:docMk/>
+            <pc:sldMk cId="690344040" sldId="261"/>
+            <ac:picMk id="12" creationId="{B0054F28-3BC5-4F33-A834-158352933717}"/>
+          </ac:picMkLst>
+        </pc:picChg>
+        <pc:picChg chg="add del mod">
+          <ac:chgData name="Peter Fison" userId="414d6edd842eada8" providerId="LiveId" clId="{A4CD6E9A-18C3-4F43-9F4A-6EB9A7A6C9AA}" dt="2021-01-24T14:35:04.986" v="530" actId="478"/>
+          <ac:picMkLst>
+            <pc:docMk/>
+            <pc:sldMk cId="690344040" sldId="261"/>
+            <ac:picMk id="13" creationId="{99326C8E-26EB-4F04-85F7-2CE02A23070D}"/>
+          </ac:picMkLst>
+        </pc:picChg>
+        <pc:picChg chg="add del mod">
+          <ac:chgData name="Peter Fison" userId="414d6edd842eada8" providerId="LiveId" clId="{A4CD6E9A-18C3-4F43-9F4A-6EB9A7A6C9AA}" dt="2021-01-24T14:35:36.497" v="540" actId="478"/>
+          <ac:picMkLst>
+            <pc:docMk/>
+            <pc:sldMk cId="690344040" sldId="261"/>
+            <ac:picMk id="14" creationId="{292740B5-7F7F-411A-8E65-A3D30308E9B5}"/>
+          </ac:picMkLst>
+        </pc:picChg>
+        <pc:picChg chg="add del mod modCrop">
+          <ac:chgData name="Peter Fison" userId="414d6edd842eada8" providerId="LiveId" clId="{A4CD6E9A-18C3-4F43-9F4A-6EB9A7A6C9AA}" dt="2021-01-24T14:37:08.170" v="563" actId="478"/>
+          <ac:picMkLst>
+            <pc:docMk/>
+            <pc:sldMk cId="690344040" sldId="261"/>
+            <ac:picMk id="15" creationId="{1A0F2FA4-A160-4D76-835D-488BFE3243D2}"/>
+          </ac:picMkLst>
+        </pc:picChg>
+        <pc:picChg chg="add mod modCrop">
+          <ac:chgData name="Peter Fison" userId="414d6edd842eada8" providerId="LiveId" clId="{A4CD6E9A-18C3-4F43-9F4A-6EB9A7A6C9AA}" dt="2021-01-24T14:37:34.582" v="565" actId="732"/>
+          <ac:picMkLst>
+            <pc:docMk/>
+            <pc:sldMk cId="690344040" sldId="261"/>
+            <ac:picMk id="16" creationId="{16067B92-6F8A-4875-B57E-B0208C1B2090}"/>
+          </ac:picMkLst>
+        </pc:picChg>
+      </pc:sldChg>
+      <pc:sldChg chg="addSp modSp new ord">
+        <pc:chgData name="Peter Fison" userId="414d6edd842eada8" providerId="LiveId" clId="{A4CD6E9A-18C3-4F43-9F4A-6EB9A7A6C9AA}" dt="2021-01-24T14:40:33.513" v="619"/>
+        <pc:sldMkLst>
+          <pc:docMk/>
+          <pc:sldMk cId="1558711399" sldId="262"/>
+        </pc:sldMkLst>
+        <pc:picChg chg="add mod">
+          <ac:chgData name="Peter Fison" userId="414d6edd842eada8" providerId="LiveId" clId="{A4CD6E9A-18C3-4F43-9F4A-6EB9A7A6C9AA}" dt="2021-01-24T14:28:56.204" v="428"/>
+          <ac:picMkLst>
+            <pc:docMk/>
+            <pc:sldMk cId="1558711399" sldId="262"/>
+            <ac:picMk id="2" creationId="{27DA100C-D705-4A14-8B46-FF218B55CC2D}"/>
+          </ac:picMkLst>
+        </pc:picChg>
+      </pc:sldChg>
+      <pc:sldChg chg="addSp new">
+        <pc:chgData name="Peter Fison" userId="414d6edd842eada8" providerId="LiveId" clId="{A4CD6E9A-18C3-4F43-9F4A-6EB9A7A6C9AA}" dt="2021-01-24T14:40:30.715" v="617"/>
+        <pc:sldMkLst>
+          <pc:docMk/>
+          <pc:sldMk cId="3783458221" sldId="263"/>
+        </pc:sldMkLst>
+        <pc:picChg chg="add">
+          <ac:chgData name="Peter Fison" userId="414d6edd842eada8" providerId="LiveId" clId="{A4CD6E9A-18C3-4F43-9F4A-6EB9A7A6C9AA}" dt="2021-01-24T14:40:30.715" v="617"/>
+          <ac:picMkLst>
+            <pc:docMk/>
+            <pc:sldMk cId="3783458221" sldId="263"/>
+            <ac:picMk id="2" creationId="{7F290E71-2DDB-49D5-A83F-544798882B77}"/>
+          </ac:picMkLst>
+        </pc:picChg>
+      </pc:sldChg>
+    </pc:docChg>
+  </pc:docChgLst>
   <pc:docChgLst>
     <pc:chgData name="Peter Fison" userId="414d6edd842eada8" providerId="LiveId" clId="{22B001C6-88E7-41D7-A943-5A5CD60088F3}"/>
     <pc:docChg chg="undo custSel modSld">
@@ -402,7 +656,7 @@
           <a:p>
             <a:fld id="{2CE7C7E5-49C6-4B10-A40B-9FC62228FE97}" type="datetimeFigureOut">
               <a:rPr lang="en-GB" smtClean="0"/>
-              <a:t>13/12/2020</a:t>
+              <a:t>24/01/2021</a:t>
             </a:fld>
             <a:endParaRPr lang="en-GB"/>
           </a:p>
@@ -602,7 +856,7 @@
           <a:p>
             <a:fld id="{2CE7C7E5-49C6-4B10-A40B-9FC62228FE97}" type="datetimeFigureOut">
               <a:rPr lang="en-GB" smtClean="0"/>
-              <a:t>13/12/2020</a:t>
+              <a:t>24/01/2021</a:t>
             </a:fld>
             <a:endParaRPr lang="en-GB"/>
           </a:p>
@@ -812,7 +1066,7 @@
           <a:p>
             <a:fld id="{2CE7C7E5-49C6-4B10-A40B-9FC62228FE97}" type="datetimeFigureOut">
               <a:rPr lang="en-GB" smtClean="0"/>
-              <a:t>13/12/2020</a:t>
+              <a:t>24/01/2021</a:t>
             </a:fld>
             <a:endParaRPr lang="en-GB"/>
           </a:p>
@@ -1012,7 +1266,7 @@
           <a:p>
             <a:fld id="{2CE7C7E5-49C6-4B10-A40B-9FC62228FE97}" type="datetimeFigureOut">
               <a:rPr lang="en-GB" smtClean="0"/>
-              <a:t>13/12/2020</a:t>
+              <a:t>24/01/2021</a:t>
             </a:fld>
             <a:endParaRPr lang="en-GB"/>
           </a:p>
@@ -1288,7 +1542,7 @@
           <a:p>
             <a:fld id="{2CE7C7E5-49C6-4B10-A40B-9FC62228FE97}" type="datetimeFigureOut">
               <a:rPr lang="en-GB" smtClean="0"/>
-              <a:t>13/12/2020</a:t>
+              <a:t>24/01/2021</a:t>
             </a:fld>
             <a:endParaRPr lang="en-GB"/>
           </a:p>
@@ -1556,7 +1810,7 @@
           <a:p>
             <a:fld id="{2CE7C7E5-49C6-4B10-A40B-9FC62228FE97}" type="datetimeFigureOut">
               <a:rPr lang="en-GB" smtClean="0"/>
-              <a:t>13/12/2020</a:t>
+              <a:t>24/01/2021</a:t>
             </a:fld>
             <a:endParaRPr lang="en-GB"/>
           </a:p>
@@ -1971,7 +2225,7 @@
           <a:p>
             <a:fld id="{2CE7C7E5-49C6-4B10-A40B-9FC62228FE97}" type="datetimeFigureOut">
               <a:rPr lang="en-GB" smtClean="0"/>
-              <a:t>13/12/2020</a:t>
+              <a:t>24/01/2021</a:t>
             </a:fld>
             <a:endParaRPr lang="en-GB"/>
           </a:p>
@@ -2113,7 +2367,7 @@
           <a:p>
             <a:fld id="{2CE7C7E5-49C6-4B10-A40B-9FC62228FE97}" type="datetimeFigureOut">
               <a:rPr lang="en-GB" smtClean="0"/>
-              <a:t>13/12/2020</a:t>
+              <a:t>24/01/2021</a:t>
             </a:fld>
             <a:endParaRPr lang="en-GB"/>
           </a:p>
@@ -2226,7 +2480,7 @@
           <a:p>
             <a:fld id="{2CE7C7E5-49C6-4B10-A40B-9FC62228FE97}" type="datetimeFigureOut">
               <a:rPr lang="en-GB" smtClean="0"/>
-              <a:t>13/12/2020</a:t>
+              <a:t>24/01/2021</a:t>
             </a:fld>
             <a:endParaRPr lang="en-GB"/>
           </a:p>
@@ -2539,7 +2793,7 @@
           <a:p>
             <a:fld id="{2CE7C7E5-49C6-4B10-A40B-9FC62228FE97}" type="datetimeFigureOut">
               <a:rPr lang="en-GB" smtClean="0"/>
-              <a:t>13/12/2020</a:t>
+              <a:t>24/01/2021</a:t>
             </a:fld>
             <a:endParaRPr lang="en-GB"/>
           </a:p>
@@ -2828,7 +3082,7 @@
           <a:p>
             <a:fld id="{2CE7C7E5-49C6-4B10-A40B-9FC62228FE97}" type="datetimeFigureOut">
               <a:rPr lang="en-GB" smtClean="0"/>
-              <a:t>13/12/2020</a:t>
+              <a:t>24/01/2021</a:t>
             </a:fld>
             <a:endParaRPr lang="en-GB"/>
           </a:p>
@@ -3071,7 +3325,7 @@
           <a:p>
             <a:fld id="{2CE7C7E5-49C6-4B10-A40B-9FC62228FE97}" type="datetimeFigureOut">
               <a:rPr lang="en-GB" smtClean="0"/>
-              <a:t>13/12/2020</a:t>
+              <a:t>24/01/2021</a:t>
             </a:fld>
             <a:endParaRPr lang="en-GB"/>
           </a:p>
@@ -4415,6 +4669,652 @@
 </p:sld>
 </file>
 
+<file path=ppt/slides/slide3.xml><?xml version="1.0" encoding="utf-8"?>
+<p:sld xmlns:a="http://schemas.openxmlformats.org/drawingml/2006/main" xmlns:r="http://schemas.openxmlformats.org/officeDocument/2006/relationships" xmlns:p="http://schemas.openxmlformats.org/presentationml/2006/main">
+  <p:cSld>
+    <p:spTree>
+      <p:nvGrpSpPr>
+        <p:cNvPr id="1" name=""/>
+        <p:cNvGrpSpPr/>
+        <p:nvPr/>
+      </p:nvGrpSpPr>
+      <p:grpSpPr>
+        <a:xfrm>
+          <a:off x="0" y="0"/>
+          <a:ext cx="0" cy="0"/>
+          <a:chOff x="0" y="0"/>
+          <a:chExt cx="0" cy="0"/>
+        </a:xfrm>
+      </p:grpSpPr>
+      <p:pic>
+        <p:nvPicPr>
+          <p:cNvPr id="2" name="Picture 1">
+            <a:extLst>
+              <a:ext uri="{FF2B5EF4-FFF2-40B4-BE49-F238E27FC236}">
+                <a16:creationId xmlns:a16="http://schemas.microsoft.com/office/drawing/2014/main" id="{B46493AC-AE8F-4B91-8C0D-0D185605539A}"/>
+              </a:ext>
+            </a:extLst>
+          </p:cNvPr>
+          <p:cNvPicPr>
+            <a:picLocks noChangeAspect="1"/>
+          </p:cNvPicPr>
+          <p:nvPr/>
+        </p:nvPicPr>
+        <p:blipFill>
+          <a:blip r:embed="rId2"/>
+          <a:stretch>
+            <a:fillRect/>
+          </a:stretch>
+        </p:blipFill>
+        <p:spPr>
+          <a:xfrm>
+            <a:off x="5870959" y="738041"/>
+            <a:ext cx="5648325" cy="5753100"/>
+          </a:xfrm>
+          <a:prstGeom prst="rect">
+            <a:avLst/>
+          </a:prstGeom>
+        </p:spPr>
+      </p:pic>
+      <p:sp>
+        <p:nvSpPr>
+          <p:cNvPr id="3" name="TextBox 2">
+            <a:extLst>
+              <a:ext uri="{FF2B5EF4-FFF2-40B4-BE49-F238E27FC236}">
+                <a16:creationId xmlns:a16="http://schemas.microsoft.com/office/drawing/2014/main" id="{F761282A-938E-412E-A4B8-7831DE3E9A20}"/>
+              </a:ext>
+            </a:extLst>
+          </p:cNvPr>
+          <p:cNvSpPr txBox="1"/>
+          <p:nvPr/>
+        </p:nvSpPr>
+        <p:spPr>
+          <a:xfrm>
+            <a:off x="5955073" y="1300454"/>
+            <a:ext cx="3272050" cy="1384995"/>
+          </a:xfrm>
+          <a:prstGeom prst="rect">
+            <a:avLst/>
+          </a:prstGeom>
+          <a:noFill/>
+        </p:spPr>
+        <p:txBody>
+          <a:bodyPr wrap="none" rtlCol="0">
+            <a:spAutoFit/>
+          </a:bodyPr>
+          <a:lstStyle/>
+          <a:p>
+            <a:r>
+              <a:rPr lang="en-GB" sz="2000" b="1" dirty="0">
+                <a:latin typeface="Ink Free" panose="03080402000500000000" pitchFamily="66" charset="0"/>
+              </a:rPr>
+              <a:t>We need a way to use</a:t>
+            </a:r>
+          </a:p>
+          <a:p>
+            <a:r>
+              <a:rPr lang="en-GB" sz="2000" b="1" dirty="0">
+                <a:latin typeface="Ink Free" panose="03080402000500000000" pitchFamily="66" charset="0"/>
+              </a:rPr>
+              <a:t>Python </a:t>
+            </a:r>
+            <a:r>
+              <a:rPr lang="en-GB" sz="2000" b="1" dirty="0" err="1">
+                <a:latin typeface="Ink Free" panose="03080402000500000000" pitchFamily="66" charset="0"/>
+              </a:rPr>
+              <a:t>dicts</a:t>
+            </a:r>
+            <a:r>
+              <a:rPr lang="en-GB" sz="2000" b="1" dirty="0">
+                <a:latin typeface="Ink Free" panose="03080402000500000000" pitchFamily="66" charset="0"/>
+              </a:rPr>
+              <a:t> and .attributes</a:t>
+            </a:r>
+          </a:p>
+          <a:p>
+            <a:r>
+              <a:rPr lang="en-GB" sz="2000" b="1" dirty="0">
+                <a:latin typeface="Ink Free" panose="03080402000500000000" pitchFamily="66" charset="0"/>
+              </a:rPr>
+              <a:t>interchangeably…</a:t>
+            </a:r>
+          </a:p>
+          <a:p>
+            <a:endParaRPr lang="en-GB" sz="2400" b="1" dirty="0">
+              <a:latin typeface="Ink Free" panose="03080402000500000000" pitchFamily="66" charset="0"/>
+            </a:endParaRPr>
+          </a:p>
+        </p:txBody>
+      </p:sp>
+      <p:pic>
+        <p:nvPicPr>
+          <p:cNvPr id="7" name="Picture 6">
+            <a:extLst>
+              <a:ext uri="{FF2B5EF4-FFF2-40B4-BE49-F238E27FC236}">
+                <a16:creationId xmlns:a16="http://schemas.microsoft.com/office/drawing/2014/main" id="{63C1F3E9-22F5-405F-BA85-0A715BE12817}"/>
+              </a:ext>
+            </a:extLst>
+          </p:cNvPr>
+          <p:cNvPicPr>
+            <a:picLocks noChangeAspect="1"/>
+          </p:cNvPicPr>
+          <p:nvPr/>
+        </p:nvPicPr>
+        <p:blipFill>
+          <a:blip r:embed="rId3">
+            <a:clrChange>
+              <a:clrFrom>
+                <a:srgbClr val="000000">
+                  <a:alpha val="0"/>
+                </a:srgbClr>
+              </a:clrFrom>
+              <a:clrTo>
+                <a:srgbClr val="000000">
+                  <a:alpha val="0"/>
+                </a:srgbClr>
+              </a:clrTo>
+            </a:clrChange>
+          </a:blip>
+          <a:stretch>
+            <a:fillRect/>
+          </a:stretch>
+        </p:blipFill>
+        <p:spPr>
+          <a:xfrm rot="20620567">
+            <a:off x="6577562" y="5254134"/>
+            <a:ext cx="933953" cy="981500"/>
+          </a:xfrm>
+          <a:prstGeom prst="rect">
+            <a:avLst/>
+          </a:prstGeom>
+        </p:spPr>
+      </p:pic>
+      <p:sp>
+        <p:nvSpPr>
+          <p:cNvPr id="11" name="TextBox 10">
+            <a:extLst>
+              <a:ext uri="{FF2B5EF4-FFF2-40B4-BE49-F238E27FC236}">
+                <a16:creationId xmlns:a16="http://schemas.microsoft.com/office/drawing/2014/main" id="{F93EB279-305C-46DD-826A-D2CC7F6B109E}"/>
+              </a:ext>
+            </a:extLst>
+          </p:cNvPr>
+          <p:cNvSpPr txBox="1"/>
+          <p:nvPr/>
+        </p:nvSpPr>
+        <p:spPr>
+          <a:xfrm>
+            <a:off x="80165" y="738041"/>
+            <a:ext cx="4698722" cy="4708981"/>
+          </a:xfrm>
+          <a:prstGeom prst="rect">
+            <a:avLst/>
+          </a:prstGeom>
+          <a:noFill/>
+        </p:spPr>
+        <p:txBody>
+          <a:bodyPr wrap="none" rtlCol="0">
+            <a:spAutoFit/>
+          </a:bodyPr>
+          <a:lstStyle/>
+          <a:p>
+            <a:r>
+              <a:rPr lang="en-GB" sz="2000" b="1" dirty="0">
+                <a:latin typeface="Ink Free" panose="03080402000500000000" pitchFamily="66" charset="0"/>
+              </a:rPr>
+              <a:t>class </a:t>
+            </a:r>
+            <a:r>
+              <a:rPr lang="en-GB" sz="2000" b="1" dirty="0" err="1">
+                <a:latin typeface="Ink Free" panose="03080402000500000000" pitchFamily="66" charset="0"/>
+              </a:rPr>
+              <a:t>ConvolutedInterchange</a:t>
+            </a:r>
+            <a:r>
+              <a:rPr lang="en-GB" sz="2000" b="1" dirty="0">
+                <a:latin typeface="Ink Free" panose="03080402000500000000" pitchFamily="66" charset="0"/>
+              </a:rPr>
+              <a:t>(</a:t>
+            </a:r>
+            <a:r>
+              <a:rPr lang="en-GB" sz="2000" b="1" dirty="0" err="1">
+                <a:latin typeface="Ink Free" panose="03080402000500000000" pitchFamily="66" charset="0"/>
+              </a:rPr>
+              <a:t>data_dict</a:t>
+            </a:r>
+            <a:r>
+              <a:rPr lang="en-GB" sz="2000" b="1" dirty="0">
+                <a:latin typeface="Ink Free" panose="03080402000500000000" pitchFamily="66" charset="0"/>
+              </a:rPr>
+              <a:t>):</a:t>
+            </a:r>
+          </a:p>
+          <a:p>
+            <a:r>
+              <a:rPr lang="en-GB" sz="2000" b="1" dirty="0">
+                <a:latin typeface="Ink Free" panose="03080402000500000000" pitchFamily="66" charset="0"/>
+              </a:rPr>
+              <a:t>    def __</a:t>
+            </a:r>
+            <a:r>
+              <a:rPr lang="en-GB" sz="2000" b="1" dirty="0" err="1">
+                <a:latin typeface="Ink Free" panose="03080402000500000000" pitchFamily="66" charset="0"/>
+              </a:rPr>
+              <a:t>init</a:t>
+            </a:r>
+            <a:r>
+              <a:rPr lang="en-GB" sz="2000" b="1" dirty="0">
+                <a:latin typeface="Ink Free" panose="03080402000500000000" pitchFamily="66" charset="0"/>
+              </a:rPr>
+              <a:t>__(self, *</a:t>
+            </a:r>
+            <a:r>
+              <a:rPr lang="en-GB" sz="2000" b="1" dirty="0" err="1">
+                <a:latin typeface="Ink Free" panose="03080402000500000000" pitchFamily="66" charset="0"/>
+              </a:rPr>
+              <a:t>args</a:t>
+            </a:r>
+            <a:r>
+              <a:rPr lang="en-GB" sz="2000" b="1" dirty="0">
+                <a:latin typeface="Ink Free" panose="03080402000500000000" pitchFamily="66" charset="0"/>
+              </a:rPr>
+              <a:t>, **</a:t>
+            </a:r>
+            <a:r>
+              <a:rPr lang="en-GB" sz="2000" b="1" dirty="0" err="1">
+                <a:latin typeface="Ink Free" panose="03080402000500000000" pitchFamily="66" charset="0"/>
+              </a:rPr>
+              <a:t>kwargs</a:t>
+            </a:r>
+            <a:r>
+              <a:rPr lang="en-GB" sz="2000" b="1" dirty="0">
+                <a:latin typeface="Ink Free" panose="03080402000500000000" pitchFamily="66" charset="0"/>
+              </a:rPr>
+              <a:t>):</a:t>
+            </a:r>
+          </a:p>
+          <a:p>
+            <a:r>
+              <a:rPr lang="en-GB" sz="2000" b="1" dirty="0">
+                <a:latin typeface="Ink Free" panose="03080402000500000000" pitchFamily="66" charset="0"/>
+              </a:rPr>
+              <a:t>        for key, value in </a:t>
+            </a:r>
+            <a:r>
+              <a:rPr lang="en-GB" sz="2000" b="1" dirty="0" err="1">
+                <a:latin typeface="Ink Free" panose="03080402000500000000" pitchFamily="66" charset="0"/>
+              </a:rPr>
+              <a:t>data_dict.items</a:t>
+            </a:r>
+            <a:r>
+              <a:rPr lang="en-GB" sz="2000" b="1" dirty="0">
+                <a:latin typeface="Ink Free" panose="03080402000500000000" pitchFamily="66" charset="0"/>
+              </a:rPr>
+              <a:t>():</a:t>
+            </a:r>
+          </a:p>
+          <a:p>
+            <a:r>
+              <a:rPr lang="en-GB" sz="2000" b="1" dirty="0">
+                <a:latin typeface="Ink Free" panose="03080402000500000000" pitchFamily="66" charset="0"/>
+              </a:rPr>
+              <a:t>            if not </a:t>
+            </a:r>
+            <a:r>
+              <a:rPr lang="en-GB" sz="2000" b="1" dirty="0" err="1">
+                <a:latin typeface="Ink Free" panose="03080402000500000000" pitchFamily="66" charset="0"/>
+              </a:rPr>
+              <a:t>is_permissible_name</a:t>
+            </a:r>
+            <a:r>
+              <a:rPr lang="en-GB" sz="2000" b="1" dirty="0">
+                <a:latin typeface="Ink Free" panose="03080402000500000000" pitchFamily="66" charset="0"/>
+              </a:rPr>
+              <a:t>(key):</a:t>
+            </a:r>
+          </a:p>
+          <a:p>
+            <a:r>
+              <a:rPr lang="en-GB" sz="2000" b="1" dirty="0">
+                <a:latin typeface="Ink Free" panose="03080402000500000000" pitchFamily="66" charset="0"/>
+              </a:rPr>
+              <a:t>                key = </a:t>
+            </a:r>
+            <a:r>
+              <a:rPr lang="en-GB" sz="2000" b="1" dirty="0" err="1">
+                <a:latin typeface="Ink Free" panose="03080402000500000000" pitchFamily="66" charset="0"/>
+              </a:rPr>
+              <a:t>normalise_key</a:t>
+            </a:r>
+            <a:r>
+              <a:rPr lang="en-GB" sz="2000" b="1" dirty="0">
+                <a:latin typeface="Ink Free" panose="03080402000500000000" pitchFamily="66" charset="0"/>
+              </a:rPr>
+              <a:t>(key)</a:t>
+            </a:r>
+          </a:p>
+          <a:p>
+            <a:r>
+              <a:rPr lang="en-GB" sz="2000" b="1" dirty="0">
+                <a:latin typeface="Ink Free" panose="03080402000500000000" pitchFamily="66" charset="0"/>
+              </a:rPr>
+              <a:t>                </a:t>
+            </a:r>
+            <a:r>
+              <a:rPr lang="en-GB" sz="2000" b="1" dirty="0" err="1">
+                <a:latin typeface="Ink Free" panose="03080402000500000000" pitchFamily="66" charset="0"/>
+              </a:rPr>
+              <a:t>data_dict.update</a:t>
+            </a:r>
+            <a:r>
+              <a:rPr lang="en-GB" sz="2000" b="1" dirty="0">
+                <a:latin typeface="Ink Free" panose="03080402000500000000" pitchFamily="66" charset="0"/>
+              </a:rPr>
+              <a:t>({key: value})</a:t>
+            </a:r>
+          </a:p>
+          <a:p>
+            <a:r>
+              <a:rPr lang="en-GB" sz="2000" b="1" dirty="0">
+                <a:latin typeface="Ink Free" panose="03080402000500000000" pitchFamily="66" charset="0"/>
+              </a:rPr>
+              <a:t>            </a:t>
+            </a:r>
+            <a:r>
+              <a:rPr lang="en-GB" sz="2000" b="1" dirty="0" err="1">
+                <a:latin typeface="Ink Free" panose="03080402000500000000" pitchFamily="66" charset="0"/>
+              </a:rPr>
+              <a:t>setattr</a:t>
+            </a:r>
+            <a:r>
+              <a:rPr lang="en-GB" sz="2000" b="1" dirty="0">
+                <a:latin typeface="Ink Free" panose="03080402000500000000" pitchFamily="66" charset="0"/>
+              </a:rPr>
+              <a:t>(self, key, value)</a:t>
+            </a:r>
+          </a:p>
+          <a:p>
+            <a:r>
+              <a:rPr lang="en-GB" sz="2000" b="1" dirty="0">
+                <a:latin typeface="Ink Free" panose="03080402000500000000" pitchFamily="66" charset="0"/>
+              </a:rPr>
+              <a:t>            self.edge_case_1()</a:t>
+            </a:r>
+          </a:p>
+          <a:p>
+            <a:r>
+              <a:rPr lang="en-GB" sz="2000" b="1" dirty="0">
+                <a:latin typeface="Ink Free" panose="03080402000500000000" pitchFamily="66" charset="0"/>
+              </a:rPr>
+              <a:t>            self.edge_case_2()</a:t>
+            </a:r>
+          </a:p>
+          <a:p>
+            <a:r>
+              <a:rPr lang="en-GB" sz="2000" b="1" dirty="0">
+                <a:latin typeface="Ink Free" panose="03080402000500000000" pitchFamily="66" charset="0"/>
+              </a:rPr>
+              <a:t>            self.edge_case_3()</a:t>
+            </a:r>
+          </a:p>
+          <a:p>
+            <a:r>
+              <a:rPr lang="en-GB" sz="2000" b="1" dirty="0">
+                <a:latin typeface="Ink Free" panose="03080402000500000000" pitchFamily="66" charset="0"/>
+              </a:rPr>
+              <a:t>            self.edge_case_4()</a:t>
+            </a:r>
+          </a:p>
+          <a:p>
+            <a:r>
+              <a:rPr lang="en-GB" sz="2000" b="1" dirty="0">
+                <a:latin typeface="Ink Free" panose="03080402000500000000" pitchFamily="66" charset="0"/>
+              </a:rPr>
+              <a:t>            self.edge_case_5()</a:t>
+            </a:r>
+          </a:p>
+          <a:p>
+            <a:r>
+              <a:rPr lang="en-GB" sz="2000" b="1" dirty="0">
+                <a:latin typeface="Ink Free" panose="03080402000500000000" pitchFamily="66" charset="0"/>
+              </a:rPr>
+              <a:t>	self.edge_case_6()</a:t>
+            </a:r>
+          </a:p>
+          <a:p>
+            <a:r>
+              <a:rPr lang="en-GB" sz="2000" b="1" dirty="0">
+                <a:latin typeface="Ink Free" panose="03080402000500000000" pitchFamily="66" charset="0"/>
+              </a:rPr>
+              <a:t>	self.edge_case_7()</a:t>
+            </a:r>
+          </a:p>
+          <a:p>
+            <a:r>
+              <a:rPr lang="en-GB" sz="2000" b="1" dirty="0" err="1">
+                <a:solidFill>
+                  <a:srgbClr val="0077BB"/>
+                </a:solidFill>
+                <a:latin typeface="Ink Free" panose="03080402000500000000" pitchFamily="66" charset="0"/>
+              </a:rPr>
+              <a:t>CleverDict</a:t>
+            </a:r>
+            <a:endParaRPr lang="en-GB" sz="2000" b="1" dirty="0">
+              <a:solidFill>
+                <a:srgbClr val="0077BB"/>
+              </a:solidFill>
+              <a:latin typeface="Ink Free" panose="03080402000500000000" pitchFamily="66" charset="0"/>
+            </a:endParaRPr>
+          </a:p>
+        </p:txBody>
+      </p:sp>
+      <p:pic>
+        <p:nvPicPr>
+          <p:cNvPr id="16" name="Picture 15">
+            <a:extLst>
+              <a:ext uri="{FF2B5EF4-FFF2-40B4-BE49-F238E27FC236}">
+                <a16:creationId xmlns:a16="http://schemas.microsoft.com/office/drawing/2014/main" id="{16067B92-6F8A-4875-B57E-B0208C1B2090}"/>
+              </a:ext>
+            </a:extLst>
+          </p:cNvPr>
+          <p:cNvPicPr>
+            <a:picLocks noChangeAspect="1"/>
+          </p:cNvPicPr>
+          <p:nvPr/>
+        </p:nvPicPr>
+        <p:blipFill rotWithShape="1">
+          <a:blip r:embed="rId4"/>
+          <a:srcRect b="18014"/>
+          <a:stretch/>
+        </p:blipFill>
+        <p:spPr>
+          <a:xfrm>
+            <a:off x="5847902" y="2524753"/>
+            <a:ext cx="2347163" cy="1864367"/>
+          </a:xfrm>
+          <a:prstGeom prst="rect">
+            <a:avLst/>
+          </a:prstGeom>
+        </p:spPr>
+      </p:pic>
+      <p:sp>
+        <p:nvSpPr>
+          <p:cNvPr id="18" name="TextBox 17">
+            <a:extLst>
+              <a:ext uri="{FF2B5EF4-FFF2-40B4-BE49-F238E27FC236}">
+                <a16:creationId xmlns:a16="http://schemas.microsoft.com/office/drawing/2014/main" id="{AC0B925E-BB37-4578-82D6-A92656B26848}"/>
+              </a:ext>
+            </a:extLst>
+          </p:cNvPr>
+          <p:cNvSpPr txBox="1"/>
+          <p:nvPr/>
+        </p:nvSpPr>
+        <p:spPr>
+          <a:xfrm rot="20647404">
+            <a:off x="6284421" y="4958000"/>
+            <a:ext cx="1194558" cy="369332"/>
+          </a:xfrm>
+          <a:prstGeom prst="rect">
+            <a:avLst/>
+          </a:prstGeom>
+          <a:noFill/>
+        </p:spPr>
+        <p:txBody>
+          <a:bodyPr wrap="none" rtlCol="0">
+            <a:spAutoFit/>
+          </a:bodyPr>
+          <a:lstStyle/>
+          <a:p>
+            <a:r>
+              <a:rPr lang="en-GB" sz="1800" b="1" dirty="0" err="1">
+                <a:solidFill>
+                  <a:srgbClr val="0077BB"/>
+                </a:solidFill>
+                <a:latin typeface="Ink Free" panose="03080402000500000000" pitchFamily="66" charset="0"/>
+              </a:rPr>
+              <a:t>CleverDict</a:t>
+            </a:r>
+            <a:endParaRPr lang="en-GB" sz="1800" b="1" dirty="0">
+              <a:solidFill>
+                <a:srgbClr val="0077BB"/>
+              </a:solidFill>
+              <a:latin typeface="Ink Free" panose="03080402000500000000" pitchFamily="66" charset="0"/>
+            </a:endParaRPr>
+          </a:p>
+        </p:txBody>
+      </p:sp>
+    </p:spTree>
+    <p:extLst>
+      <p:ext uri="{BB962C8B-B14F-4D97-AF65-F5344CB8AC3E}">
+        <p14:creationId xmlns:p14="http://schemas.microsoft.com/office/powerpoint/2010/main" val="690344040"/>
+      </p:ext>
+    </p:extLst>
+  </p:cSld>
+  <p:clrMapOvr>
+    <a:masterClrMapping/>
+  </p:clrMapOvr>
+</p:sld>
+</file>
+
+<file path=ppt/slides/slide4.xml><?xml version="1.0" encoding="utf-8"?>
+<p:sld xmlns:a="http://schemas.openxmlformats.org/drawingml/2006/main" xmlns:r="http://schemas.openxmlformats.org/officeDocument/2006/relationships" xmlns:p="http://schemas.openxmlformats.org/presentationml/2006/main">
+  <p:cSld>
+    <p:spTree>
+      <p:nvGrpSpPr>
+        <p:cNvPr id="1" name=""/>
+        <p:cNvGrpSpPr/>
+        <p:nvPr/>
+      </p:nvGrpSpPr>
+      <p:grpSpPr>
+        <a:xfrm>
+          <a:off x="0" y="0"/>
+          <a:ext cx="0" cy="0"/>
+          <a:chOff x="0" y="0"/>
+          <a:chExt cx="0" cy="0"/>
+        </a:xfrm>
+      </p:grpSpPr>
+      <p:pic>
+        <p:nvPicPr>
+          <p:cNvPr id="2" name="Picture 1">
+            <a:extLst>
+              <a:ext uri="{FF2B5EF4-FFF2-40B4-BE49-F238E27FC236}">
+                <a16:creationId xmlns:a16="http://schemas.microsoft.com/office/drawing/2014/main" id="{27DA100C-D705-4A14-8B46-FF218B55CC2D}"/>
+              </a:ext>
+            </a:extLst>
+          </p:cNvPr>
+          <p:cNvPicPr>
+            <a:picLocks noChangeAspect="1"/>
+          </p:cNvPicPr>
+          <p:nvPr/>
+        </p:nvPicPr>
+        <p:blipFill>
+          <a:blip r:embed="rId2"/>
+          <a:stretch>
+            <a:fillRect/>
+          </a:stretch>
+        </p:blipFill>
+        <p:spPr>
+          <a:xfrm>
+            <a:off x="3273307" y="551438"/>
+            <a:ext cx="5645385" cy="5755123"/>
+          </a:xfrm>
+          <a:prstGeom prst="rect">
+            <a:avLst/>
+          </a:prstGeom>
+        </p:spPr>
+      </p:pic>
+    </p:spTree>
+    <p:extLst>
+      <p:ext uri="{BB962C8B-B14F-4D97-AF65-F5344CB8AC3E}">
+        <p14:creationId xmlns:p14="http://schemas.microsoft.com/office/powerpoint/2010/main" val="1558711399"/>
+      </p:ext>
+    </p:extLst>
+  </p:cSld>
+  <p:clrMapOvr>
+    <a:masterClrMapping/>
+  </p:clrMapOvr>
+</p:sld>
+</file>
+
+<file path=ppt/slides/slide5.xml><?xml version="1.0" encoding="utf-8"?>
+<p:sld xmlns:a="http://schemas.openxmlformats.org/drawingml/2006/main" xmlns:r="http://schemas.openxmlformats.org/officeDocument/2006/relationships" xmlns:p="http://schemas.openxmlformats.org/presentationml/2006/main">
+  <p:cSld>
+    <p:spTree>
+      <p:nvGrpSpPr>
+        <p:cNvPr id="1" name=""/>
+        <p:cNvGrpSpPr/>
+        <p:nvPr/>
+      </p:nvGrpSpPr>
+      <p:grpSpPr>
+        <a:xfrm>
+          <a:off x="0" y="0"/>
+          <a:ext cx="0" cy="0"/>
+          <a:chOff x="0" y="0"/>
+          <a:chExt cx="0" cy="0"/>
+        </a:xfrm>
+      </p:grpSpPr>
+      <p:pic>
+        <p:nvPicPr>
+          <p:cNvPr id="2" name="Picture 1">
+            <a:extLst>
+              <a:ext uri="{FF2B5EF4-FFF2-40B4-BE49-F238E27FC236}">
+                <a16:creationId xmlns:a16="http://schemas.microsoft.com/office/drawing/2014/main" id="{7F290E71-2DDB-49D5-A83F-544798882B77}"/>
+              </a:ext>
+            </a:extLst>
+          </p:cNvPr>
+          <p:cNvPicPr>
+            <a:picLocks noChangeAspect="1"/>
+          </p:cNvPicPr>
+          <p:nvPr/>
+        </p:nvPicPr>
+        <p:blipFill>
+          <a:blip r:embed="rId2"/>
+          <a:stretch>
+            <a:fillRect/>
+          </a:stretch>
+        </p:blipFill>
+        <p:spPr>
+          <a:xfrm>
+            <a:off x="3258066" y="551438"/>
+            <a:ext cx="5675868" cy="5755123"/>
+          </a:xfrm>
+          <a:prstGeom prst="rect">
+            <a:avLst/>
+          </a:prstGeom>
+        </p:spPr>
+      </p:pic>
+    </p:spTree>
+    <p:extLst>
+      <p:ext uri="{BB962C8B-B14F-4D97-AF65-F5344CB8AC3E}">
+        <p14:creationId xmlns:p14="http://schemas.microsoft.com/office/powerpoint/2010/main" val="3783458221"/>
+      </p:ext>
+    </p:extLst>
+  </p:cSld>
+  <p:clrMapOvr>
+    <a:masterClrMapping/>
+  </p:clrMapOvr>
+</p:sld>
+</file>
+
 <file path=ppt/theme/theme1.xml><?xml version="1.0" encoding="utf-8"?>
 <a:theme xmlns:a="http://schemas.openxmlformats.org/drawingml/2006/main" name="Office Theme">
   <a:themeElements>

</xml_diff>

<commit_message>
'JSON' added to Cartoon
</commit_message>
<xml_diff>
--- a/cleverdict.pptx
+++ b/cleverdict.pptx
@@ -8,8 +8,7 @@
     <p:sldId id="256" r:id="rId2"/>
     <p:sldId id="257" r:id="rId3"/>
     <p:sldId id="261" r:id="rId4"/>
-    <p:sldId id="262" r:id="rId5"/>
-    <p:sldId id="263" r:id="rId6"/>
+    <p:sldId id="263" r:id="rId5"/>
   </p:sldIdLst>
   <p:sldSz cx="12192000" cy="6858000"/>
   <p:notesSz cx="6858000" cy="9144000"/>
@@ -119,7 +118,7 @@
 <file path=ppt/revisionInfo.xml><?xml version="1.0" encoding="utf-8"?>
 <p1510:revInfo xmlns:a="http://schemas.openxmlformats.org/drawingml/2006/main" xmlns:r="http://schemas.openxmlformats.org/officeDocument/2006/relationships" xmlns:p1510="http://schemas.microsoft.com/office/powerpoint/2015/10/main">
   <p1510:revLst>
-    <p1510:client id="{A4CD6E9A-18C3-4F43-9F4A-6EB9A7A6C9AA}" v="23" dt="2021-01-24T14:40:30.715"/>
+    <p1510:client id="{A4CD6E9A-18C3-4F43-9F4A-6EB9A7A6C9AA}" v="26" dt="2021-01-24T14:47:29.533"/>
   </p1510:revLst>
 </p1510:revInfo>
 </file>
@@ -129,7 +128,7 @@
   <pc:docChgLst>
     <pc:chgData name="Peter Fison" userId="414d6edd842eada8" providerId="LiveId" clId="{A4CD6E9A-18C3-4F43-9F4A-6EB9A7A6C9AA}"/>
     <pc:docChg chg="undo custSel addSld delSld modSld sldOrd">
-      <pc:chgData name="Peter Fison" userId="414d6edd842eada8" providerId="LiveId" clId="{A4CD6E9A-18C3-4F43-9F4A-6EB9A7A6C9AA}" dt="2021-01-24T14:40:33.513" v="619"/>
+      <pc:chgData name="Peter Fison" userId="414d6edd842eada8" providerId="LiveId" clId="{A4CD6E9A-18C3-4F43-9F4A-6EB9A7A6C9AA}" dt="2021-01-24T14:57:52.125" v="637" actId="47"/>
       <pc:docMkLst>
         <pc:docMk/>
       </pc:docMkLst>
@@ -211,13 +210,13 @@
         </pc:sldMkLst>
       </pc:sldChg>
       <pc:sldChg chg="addSp delSp modSp add mod ord">
-        <pc:chgData name="Peter Fison" userId="414d6edd842eada8" providerId="LiveId" clId="{A4CD6E9A-18C3-4F43-9F4A-6EB9A7A6C9AA}" dt="2021-01-24T14:39:58.956" v="615" actId="1076"/>
+        <pc:chgData name="Peter Fison" userId="414d6edd842eada8" providerId="LiveId" clId="{A4CD6E9A-18C3-4F43-9F4A-6EB9A7A6C9AA}" dt="2021-01-24T14:47:15.188" v="632" actId="1076"/>
         <pc:sldMkLst>
           <pc:docMk/>
           <pc:sldMk cId="690344040" sldId="261"/>
         </pc:sldMkLst>
         <pc:spChg chg="mod">
-          <ac:chgData name="Peter Fison" userId="414d6edd842eada8" providerId="LiveId" clId="{A4CD6E9A-18C3-4F43-9F4A-6EB9A7A6C9AA}" dt="2021-01-24T14:34:38.540" v="521" actId="1038"/>
+          <ac:chgData name="Peter Fison" userId="414d6edd842eada8" providerId="LiveId" clId="{A4CD6E9A-18C3-4F43-9F4A-6EB9A7A6C9AA}" dt="2021-01-24T14:46:45.825" v="627" actId="20577"/>
           <ac:spMkLst>
             <pc:docMk/>
             <pc:sldMk cId="690344040" sldId="261"/>
@@ -289,7 +288,7 @@
           </ac:picMkLst>
         </pc:picChg>
         <pc:picChg chg="add mod">
-          <ac:chgData name="Peter Fison" userId="414d6edd842eada8" providerId="LiveId" clId="{A4CD6E9A-18C3-4F43-9F4A-6EB9A7A6C9AA}" dt="2021-01-24T14:34:38.540" v="521" actId="1038"/>
+          <ac:chgData name="Peter Fison" userId="414d6edd842eada8" providerId="LiveId" clId="{A4CD6E9A-18C3-4F43-9F4A-6EB9A7A6C9AA}" dt="2021-01-24T14:47:15.188" v="632" actId="1076"/>
           <ac:picMkLst>
             <pc:docMk/>
             <pc:sldMk cId="690344040" sldId="261"/>
@@ -345,8 +344,8 @@
           </ac:picMkLst>
         </pc:picChg>
       </pc:sldChg>
-      <pc:sldChg chg="addSp modSp new ord">
-        <pc:chgData name="Peter Fison" userId="414d6edd842eada8" providerId="LiveId" clId="{A4CD6E9A-18C3-4F43-9F4A-6EB9A7A6C9AA}" dt="2021-01-24T14:40:33.513" v="619"/>
+      <pc:sldChg chg="addSp modSp new del ord">
+        <pc:chgData name="Peter Fison" userId="414d6edd842eada8" providerId="LiveId" clId="{A4CD6E9A-18C3-4F43-9F4A-6EB9A7A6C9AA}" dt="2021-01-24T14:57:52.125" v="637" actId="47"/>
         <pc:sldMkLst>
           <pc:docMk/>
           <pc:sldMk cId="1558711399" sldId="262"/>
@@ -360,18 +359,66 @@
           </ac:picMkLst>
         </pc:picChg>
       </pc:sldChg>
-      <pc:sldChg chg="addSp new">
-        <pc:chgData name="Peter Fison" userId="414d6edd842eada8" providerId="LiveId" clId="{A4CD6E9A-18C3-4F43-9F4A-6EB9A7A6C9AA}" dt="2021-01-24T14:40:30.715" v="617"/>
+      <pc:sldChg chg="addSp delSp modSp new mod">
+        <pc:chgData name="Peter Fison" userId="414d6edd842eada8" providerId="LiveId" clId="{A4CD6E9A-18C3-4F43-9F4A-6EB9A7A6C9AA}" dt="2021-01-24T14:47:29.532" v="636"/>
         <pc:sldMkLst>
           <pc:docMk/>
           <pc:sldMk cId="3783458221" sldId="263"/>
         </pc:sldMkLst>
-        <pc:picChg chg="add">
-          <ac:chgData name="Peter Fison" userId="414d6edd842eada8" providerId="LiveId" clId="{A4CD6E9A-18C3-4F43-9F4A-6EB9A7A6C9AA}" dt="2021-01-24T14:40:30.715" v="617"/>
+        <pc:spChg chg="add del mod">
+          <ac:chgData name="Peter Fison" userId="414d6edd842eada8" providerId="LiveId" clId="{A4CD6E9A-18C3-4F43-9F4A-6EB9A7A6C9AA}" dt="2021-01-24T14:47:27.850" v="635"/>
+          <ac:spMkLst>
+            <pc:docMk/>
+            <pc:sldMk cId="3783458221" sldId="263"/>
+            <ac:spMk id="4" creationId="{FBF199D7-4E79-4200-B912-685D08B87AB7}"/>
+          </ac:spMkLst>
+        </pc:spChg>
+        <pc:spChg chg="add del mod">
+          <ac:chgData name="Peter Fison" userId="414d6edd842eada8" providerId="LiveId" clId="{A4CD6E9A-18C3-4F43-9F4A-6EB9A7A6C9AA}" dt="2021-01-24T14:47:27.850" v="635"/>
+          <ac:spMkLst>
+            <pc:docMk/>
+            <pc:sldMk cId="3783458221" sldId="263"/>
+            <ac:spMk id="7" creationId="{1E6F34FD-DE25-41B2-87F2-DEF987A725F4}"/>
+          </ac:spMkLst>
+        </pc:spChg>
+        <pc:picChg chg="add del">
+          <ac:chgData name="Peter Fison" userId="414d6edd842eada8" providerId="LiveId" clId="{A4CD6E9A-18C3-4F43-9F4A-6EB9A7A6C9AA}" dt="2021-01-24T14:47:25.968" v="633" actId="478"/>
           <ac:picMkLst>
             <pc:docMk/>
             <pc:sldMk cId="3783458221" sldId="263"/>
             <ac:picMk id="2" creationId="{7F290E71-2DDB-49D5-A83F-544798882B77}"/>
+          </ac:picMkLst>
+        </pc:picChg>
+        <pc:picChg chg="add del mod">
+          <ac:chgData name="Peter Fison" userId="414d6edd842eada8" providerId="LiveId" clId="{A4CD6E9A-18C3-4F43-9F4A-6EB9A7A6C9AA}" dt="2021-01-24T14:47:27.850" v="635"/>
+          <ac:picMkLst>
+            <pc:docMk/>
+            <pc:sldMk cId="3783458221" sldId="263"/>
+            <ac:picMk id="3" creationId="{748342C5-0E6B-4891-985E-82A968388BD3}"/>
+          </ac:picMkLst>
+        </pc:picChg>
+        <pc:picChg chg="add del mod">
+          <ac:chgData name="Peter Fison" userId="414d6edd842eada8" providerId="LiveId" clId="{A4CD6E9A-18C3-4F43-9F4A-6EB9A7A6C9AA}" dt="2021-01-24T14:47:27.850" v="635"/>
+          <ac:picMkLst>
+            <pc:docMk/>
+            <pc:sldMk cId="3783458221" sldId="263"/>
+            <ac:picMk id="5" creationId="{B228D73F-170B-464E-B0CC-83620E3F08CA}"/>
+          </ac:picMkLst>
+        </pc:picChg>
+        <pc:picChg chg="add del mod">
+          <ac:chgData name="Peter Fison" userId="414d6edd842eada8" providerId="LiveId" clId="{A4CD6E9A-18C3-4F43-9F4A-6EB9A7A6C9AA}" dt="2021-01-24T14:47:27.850" v="635"/>
+          <ac:picMkLst>
+            <pc:docMk/>
+            <pc:sldMk cId="3783458221" sldId="263"/>
+            <ac:picMk id="6" creationId="{AAA16EB8-D2E1-4CF9-B384-BE182C0B35BA}"/>
+          </ac:picMkLst>
+        </pc:picChg>
+        <pc:picChg chg="add">
+          <ac:chgData name="Peter Fison" userId="414d6edd842eada8" providerId="LiveId" clId="{A4CD6E9A-18C3-4F43-9F4A-6EB9A7A6C9AA}" dt="2021-01-24T14:47:29.532" v="636"/>
+          <ac:picMkLst>
+            <pc:docMk/>
+            <pc:sldMk cId="3783458221" sldId="263"/>
+            <ac:picMk id="8" creationId="{F05D3485-AFC0-4E82-A2BB-5A276DDCEAE8}"/>
           </ac:picMkLst>
         </pc:picChg>
       </pc:sldChg>
@@ -4731,7 +4778,7 @@
         <p:spPr>
           <a:xfrm>
             <a:off x="5955073" y="1300454"/>
-            <a:ext cx="3272050" cy="1384995"/>
+            <a:ext cx="3326552" cy="1384995"/>
           </a:xfrm>
           <a:prstGeom prst="rect">
             <a:avLst/>
@@ -4748,7 +4795,7 @@
               <a:rPr lang="en-GB" sz="2000" b="1" dirty="0">
                 <a:latin typeface="Ink Free" panose="03080402000500000000" pitchFamily="66" charset="0"/>
               </a:rPr>
-              <a:t>We need a way to use</a:t>
+              <a:t>We need a way to use JSON,</a:t>
             </a:r>
           </a:p>
           <a:p>
@@ -4821,8 +4868,8 @@
         </p:blipFill>
         <p:spPr>
           <a:xfrm rot="20620567">
-            <a:off x="6577562" y="5254134"/>
-            <a:ext cx="933953" cy="981500"/>
+            <a:off x="6607992" y="5261866"/>
+            <a:ext cx="998733" cy="1049578"/>
           </a:xfrm>
           <a:prstGeom prst="rect">
             <a:avLst/>
@@ -5214,70 +5261,10 @@
       </p:grpSpPr>
       <p:pic>
         <p:nvPicPr>
-          <p:cNvPr id="2" name="Picture 1">
-            <a:extLst>
-              <a:ext uri="{FF2B5EF4-FFF2-40B4-BE49-F238E27FC236}">
-                <a16:creationId xmlns:a16="http://schemas.microsoft.com/office/drawing/2014/main" id="{27DA100C-D705-4A14-8B46-FF218B55CC2D}"/>
-              </a:ext>
-            </a:extLst>
-          </p:cNvPr>
-          <p:cNvPicPr>
-            <a:picLocks noChangeAspect="1"/>
-          </p:cNvPicPr>
-          <p:nvPr/>
-        </p:nvPicPr>
-        <p:blipFill>
-          <a:blip r:embed="rId2"/>
-          <a:stretch>
-            <a:fillRect/>
-          </a:stretch>
-        </p:blipFill>
-        <p:spPr>
-          <a:xfrm>
-            <a:off x="3273307" y="551438"/>
-            <a:ext cx="5645385" cy="5755123"/>
-          </a:xfrm>
-          <a:prstGeom prst="rect">
-            <a:avLst/>
-          </a:prstGeom>
-        </p:spPr>
-      </p:pic>
-    </p:spTree>
-    <p:extLst>
-      <p:ext uri="{BB962C8B-B14F-4D97-AF65-F5344CB8AC3E}">
-        <p14:creationId xmlns:p14="http://schemas.microsoft.com/office/powerpoint/2010/main" val="1558711399"/>
-      </p:ext>
-    </p:extLst>
-  </p:cSld>
-  <p:clrMapOvr>
-    <a:masterClrMapping/>
-  </p:clrMapOvr>
-</p:sld>
-</file>
-
-<file path=ppt/slides/slide5.xml><?xml version="1.0" encoding="utf-8"?>
-<p:sld xmlns:a="http://schemas.openxmlformats.org/drawingml/2006/main" xmlns:r="http://schemas.openxmlformats.org/officeDocument/2006/relationships" xmlns:p="http://schemas.openxmlformats.org/presentationml/2006/main">
-  <p:cSld>
-    <p:spTree>
-      <p:nvGrpSpPr>
-        <p:cNvPr id="1" name=""/>
-        <p:cNvGrpSpPr/>
-        <p:nvPr/>
-      </p:nvGrpSpPr>
-      <p:grpSpPr>
-        <a:xfrm>
-          <a:off x="0" y="0"/>
-          <a:ext cx="0" cy="0"/>
-          <a:chOff x="0" y="0"/>
-          <a:chExt cx="0" cy="0"/>
-        </a:xfrm>
-      </p:grpSpPr>
-      <p:pic>
-        <p:nvPicPr>
-          <p:cNvPr id="2" name="Picture 1">
-            <a:extLst>
-              <a:ext uri="{FF2B5EF4-FFF2-40B4-BE49-F238E27FC236}">
-                <a16:creationId xmlns:a16="http://schemas.microsoft.com/office/drawing/2014/main" id="{7F290E71-2DDB-49D5-A83F-544798882B77}"/>
+          <p:cNvPr id="8" name="Picture 7">
+            <a:extLst>
+              <a:ext uri="{FF2B5EF4-FFF2-40B4-BE49-F238E27FC236}">
+                <a16:creationId xmlns:a16="http://schemas.microsoft.com/office/drawing/2014/main" id="{F05D3485-AFC0-4E82-A2BB-5A276DDCEAE8}"/>
               </a:ext>
             </a:extLst>
           </p:cNvPr>

</xml_diff>

<commit_message>
to_list & from_list working as expected
</commit_message>
<xml_diff>
--- a/cleverdict.pptx
+++ b/cleverdict.pptx
@@ -7,8 +7,9 @@
   <p:sldIdLst>
     <p:sldId id="256" r:id="rId2"/>
     <p:sldId id="257" r:id="rId3"/>
-    <p:sldId id="261" r:id="rId4"/>
-    <p:sldId id="263" r:id="rId5"/>
+    <p:sldId id="264" r:id="rId4"/>
+    <p:sldId id="261" r:id="rId5"/>
+    <p:sldId id="263" r:id="rId6"/>
   </p:sldIdLst>
   <p:sldSz cx="12192000" cy="6858000"/>
   <p:notesSz cx="6858000" cy="9144000"/>
@@ -118,7 +119,7 @@
 <file path=ppt/revisionInfo.xml><?xml version="1.0" encoding="utf-8"?>
 <p1510:revInfo xmlns:a="http://schemas.openxmlformats.org/drawingml/2006/main" xmlns:r="http://schemas.openxmlformats.org/officeDocument/2006/relationships" xmlns:p1510="http://schemas.microsoft.com/office/powerpoint/2015/10/main">
   <p1510:revLst>
-    <p1510:client id="{A4CD6E9A-18C3-4F43-9F4A-6EB9A7A6C9AA}" v="26" dt="2021-01-24T14:47:29.533"/>
+    <p1510:client id="{A4CD6E9A-18C3-4F43-9F4A-6EB9A7A6C9AA}" v="29" dt="2021-01-28T02:23:10.292"/>
   </p1510:revLst>
 </p1510:revInfo>
 </file>
@@ -128,7 +129,7 @@
   <pc:docChgLst>
     <pc:chgData name="Peter Fison" userId="414d6edd842eada8" providerId="LiveId" clId="{A4CD6E9A-18C3-4F43-9F4A-6EB9A7A6C9AA}"/>
     <pc:docChg chg="undo custSel addSld delSld modSld sldOrd">
-      <pc:chgData name="Peter Fison" userId="414d6edd842eada8" providerId="LiveId" clId="{A4CD6E9A-18C3-4F43-9F4A-6EB9A7A6C9AA}" dt="2021-01-24T14:57:52.125" v="637" actId="47"/>
+      <pc:chgData name="Peter Fison" userId="414d6edd842eada8" providerId="LiveId" clId="{A4CD6E9A-18C3-4F43-9F4A-6EB9A7A6C9AA}" dt="2021-01-28T02:27:06.395" v="657" actId="732"/>
       <pc:docMkLst>
         <pc:docMk/>
       </pc:docMkLst>
@@ -422,6 +423,45 @@
           </ac:picMkLst>
         </pc:picChg>
       </pc:sldChg>
+      <pc:sldChg chg="addSp modSp new mod">
+        <pc:chgData name="Peter Fison" userId="414d6edd842eada8" providerId="LiveId" clId="{A4CD6E9A-18C3-4F43-9F4A-6EB9A7A6C9AA}" dt="2021-01-28T02:27:06.395" v="657" actId="732"/>
+        <pc:sldMkLst>
+          <pc:docMk/>
+          <pc:sldMk cId="3046732424" sldId="264"/>
+        </pc:sldMkLst>
+        <pc:spChg chg="add mod">
+          <ac:chgData name="Peter Fison" userId="414d6edd842eada8" providerId="LiveId" clId="{A4CD6E9A-18C3-4F43-9F4A-6EB9A7A6C9AA}" dt="2021-01-28T02:23:02.298" v="648" actId="1076"/>
+          <ac:spMkLst>
+            <pc:docMk/>
+            <pc:sldMk cId="3046732424" sldId="264"/>
+            <ac:spMk id="4" creationId="{7ABAE0A7-D1C5-477E-875A-9E9B534916A1}"/>
+          </ac:spMkLst>
+        </pc:spChg>
+        <pc:picChg chg="add mod modCrop">
+          <ac:chgData name="Peter Fison" userId="414d6edd842eada8" providerId="LiveId" clId="{A4CD6E9A-18C3-4F43-9F4A-6EB9A7A6C9AA}" dt="2021-01-28T02:27:06.395" v="657" actId="732"/>
+          <ac:picMkLst>
+            <pc:docMk/>
+            <pc:sldMk cId="3046732424" sldId="264"/>
+            <ac:picMk id="2" creationId="{9EFFD346-73CB-43BE-949E-01E4D3A0663E}"/>
+          </ac:picMkLst>
+        </pc:picChg>
+        <pc:picChg chg="add mod">
+          <ac:chgData name="Peter Fison" userId="414d6edd842eada8" providerId="LiveId" clId="{A4CD6E9A-18C3-4F43-9F4A-6EB9A7A6C9AA}" dt="2021-01-28T02:22:35.789" v="642" actId="1076"/>
+          <ac:picMkLst>
+            <pc:docMk/>
+            <pc:sldMk cId="3046732424" sldId="264"/>
+            <ac:picMk id="3" creationId="{C3FC64B9-AC87-4376-AD9C-BEBA106FA23C}"/>
+          </ac:picMkLst>
+        </pc:picChg>
+        <pc:picChg chg="add mod">
+          <ac:chgData name="Peter Fison" userId="414d6edd842eada8" providerId="LiveId" clId="{A4CD6E9A-18C3-4F43-9F4A-6EB9A7A6C9AA}" dt="2021-01-28T02:23:21.910" v="651" actId="1076"/>
+          <ac:picMkLst>
+            <pc:docMk/>
+            <pc:sldMk cId="3046732424" sldId="264"/>
+            <ac:picMk id="5" creationId="{6AB5975D-A458-4F42-A9AF-165F7C8F2E8D}"/>
+          </ac:picMkLst>
+        </pc:picChg>
+      </pc:sldChg>
     </pc:docChg>
   </pc:docChgLst>
   <pc:docChgLst>
@@ -703,7 +743,7 @@
           <a:p>
             <a:fld id="{2CE7C7E5-49C6-4B10-A40B-9FC62228FE97}" type="datetimeFigureOut">
               <a:rPr lang="en-GB" smtClean="0"/>
-              <a:t>24/01/2021</a:t>
+              <a:t>28/01/2021</a:t>
             </a:fld>
             <a:endParaRPr lang="en-GB"/>
           </a:p>
@@ -903,7 +943,7 @@
           <a:p>
             <a:fld id="{2CE7C7E5-49C6-4B10-A40B-9FC62228FE97}" type="datetimeFigureOut">
               <a:rPr lang="en-GB" smtClean="0"/>
-              <a:t>24/01/2021</a:t>
+              <a:t>28/01/2021</a:t>
             </a:fld>
             <a:endParaRPr lang="en-GB"/>
           </a:p>
@@ -1113,7 +1153,7 @@
           <a:p>
             <a:fld id="{2CE7C7E5-49C6-4B10-A40B-9FC62228FE97}" type="datetimeFigureOut">
               <a:rPr lang="en-GB" smtClean="0"/>
-              <a:t>24/01/2021</a:t>
+              <a:t>28/01/2021</a:t>
             </a:fld>
             <a:endParaRPr lang="en-GB"/>
           </a:p>
@@ -1313,7 +1353,7 @@
           <a:p>
             <a:fld id="{2CE7C7E5-49C6-4B10-A40B-9FC62228FE97}" type="datetimeFigureOut">
               <a:rPr lang="en-GB" smtClean="0"/>
-              <a:t>24/01/2021</a:t>
+              <a:t>28/01/2021</a:t>
             </a:fld>
             <a:endParaRPr lang="en-GB"/>
           </a:p>
@@ -1589,7 +1629,7 @@
           <a:p>
             <a:fld id="{2CE7C7E5-49C6-4B10-A40B-9FC62228FE97}" type="datetimeFigureOut">
               <a:rPr lang="en-GB" smtClean="0"/>
-              <a:t>24/01/2021</a:t>
+              <a:t>28/01/2021</a:t>
             </a:fld>
             <a:endParaRPr lang="en-GB"/>
           </a:p>
@@ -1857,7 +1897,7 @@
           <a:p>
             <a:fld id="{2CE7C7E5-49C6-4B10-A40B-9FC62228FE97}" type="datetimeFigureOut">
               <a:rPr lang="en-GB" smtClean="0"/>
-              <a:t>24/01/2021</a:t>
+              <a:t>28/01/2021</a:t>
             </a:fld>
             <a:endParaRPr lang="en-GB"/>
           </a:p>
@@ -2272,7 +2312,7 @@
           <a:p>
             <a:fld id="{2CE7C7E5-49C6-4B10-A40B-9FC62228FE97}" type="datetimeFigureOut">
               <a:rPr lang="en-GB" smtClean="0"/>
-              <a:t>24/01/2021</a:t>
+              <a:t>28/01/2021</a:t>
             </a:fld>
             <a:endParaRPr lang="en-GB"/>
           </a:p>
@@ -2414,7 +2454,7 @@
           <a:p>
             <a:fld id="{2CE7C7E5-49C6-4B10-A40B-9FC62228FE97}" type="datetimeFigureOut">
               <a:rPr lang="en-GB" smtClean="0"/>
-              <a:t>24/01/2021</a:t>
+              <a:t>28/01/2021</a:t>
             </a:fld>
             <a:endParaRPr lang="en-GB"/>
           </a:p>
@@ -2527,7 +2567,7 @@
           <a:p>
             <a:fld id="{2CE7C7E5-49C6-4B10-A40B-9FC62228FE97}" type="datetimeFigureOut">
               <a:rPr lang="en-GB" smtClean="0"/>
-              <a:t>24/01/2021</a:t>
+              <a:t>28/01/2021</a:t>
             </a:fld>
             <a:endParaRPr lang="en-GB"/>
           </a:p>
@@ -2840,7 +2880,7 @@
           <a:p>
             <a:fld id="{2CE7C7E5-49C6-4B10-A40B-9FC62228FE97}" type="datetimeFigureOut">
               <a:rPr lang="en-GB" smtClean="0"/>
-              <a:t>24/01/2021</a:t>
+              <a:t>28/01/2021</a:t>
             </a:fld>
             <a:endParaRPr lang="en-GB"/>
           </a:p>
@@ -3129,7 +3169,7 @@
           <a:p>
             <a:fld id="{2CE7C7E5-49C6-4B10-A40B-9FC62228FE97}" type="datetimeFigureOut">
               <a:rPr lang="en-GB" smtClean="0"/>
-              <a:t>24/01/2021</a:t>
+              <a:t>28/01/2021</a:t>
             </a:fld>
             <a:endParaRPr lang="en-GB"/>
           </a:p>
@@ -3372,7 +3412,7 @@
           <a:p>
             <a:fld id="{2CE7C7E5-49C6-4B10-A40B-9FC62228FE97}" type="datetimeFigureOut">
               <a:rPr lang="en-GB" smtClean="0"/>
-              <a:t>24/01/2021</a:t>
+              <a:t>28/01/2021</a:t>
             </a:fld>
             <a:endParaRPr lang="en-GB"/>
           </a:p>
@@ -4738,6 +4778,190 @@
           <p:cNvPr id="2" name="Picture 1">
             <a:extLst>
               <a:ext uri="{FF2B5EF4-FFF2-40B4-BE49-F238E27FC236}">
+                <a16:creationId xmlns:a16="http://schemas.microsoft.com/office/drawing/2014/main" id="{9EFFD346-73CB-43BE-949E-01E4D3A0663E}"/>
+              </a:ext>
+            </a:extLst>
+          </p:cNvPr>
+          <p:cNvPicPr>
+            <a:picLocks noChangeAspect="1"/>
+          </p:cNvPicPr>
+          <p:nvPr/>
+        </p:nvPicPr>
+        <p:blipFill rotWithShape="1">
+          <a:blip r:embed="rId2"/>
+          <a:srcRect l="18147" t="11935" r="14338" b="10247"/>
+          <a:stretch/>
+        </p:blipFill>
+        <p:spPr>
+          <a:xfrm>
+            <a:off x="1291244" y="1241367"/>
+            <a:ext cx="3086792" cy="3557848"/>
+          </a:xfrm>
+          <a:prstGeom prst="rect">
+            <a:avLst/>
+          </a:prstGeom>
+        </p:spPr>
+      </p:pic>
+      <p:pic>
+        <p:nvPicPr>
+          <p:cNvPr id="3" name="Picture 2">
+            <a:extLst>
+              <a:ext uri="{FF2B5EF4-FFF2-40B4-BE49-F238E27FC236}">
+                <a16:creationId xmlns:a16="http://schemas.microsoft.com/office/drawing/2014/main" id="{C3FC64B9-AC87-4376-AD9C-BEBA106FA23C}"/>
+              </a:ext>
+            </a:extLst>
+          </p:cNvPr>
+          <p:cNvPicPr>
+            <a:picLocks noChangeAspect="1"/>
+          </p:cNvPicPr>
+          <p:nvPr/>
+        </p:nvPicPr>
+        <p:blipFill>
+          <a:blip r:embed="rId2"/>
+          <a:stretch>
+            <a:fillRect/>
+          </a:stretch>
+        </p:blipFill>
+        <p:spPr>
+          <a:xfrm>
+            <a:off x="5646474" y="695667"/>
+            <a:ext cx="4572000" cy="4572000"/>
+          </a:xfrm>
+          <a:prstGeom prst="rect">
+            <a:avLst/>
+          </a:prstGeom>
+        </p:spPr>
+      </p:pic>
+      <p:sp>
+        <p:nvSpPr>
+          <p:cNvPr id="4" name="Rectangle 3">
+            <a:extLst>
+              <a:ext uri="{FF2B5EF4-FFF2-40B4-BE49-F238E27FC236}">
+                <a16:creationId xmlns:a16="http://schemas.microsoft.com/office/drawing/2014/main" id="{7ABAE0A7-D1C5-477E-875A-9E9B534916A1}"/>
+              </a:ext>
+            </a:extLst>
+          </p:cNvPr>
+          <p:cNvSpPr/>
+          <p:nvPr/>
+        </p:nvSpPr>
+        <p:spPr>
+          <a:xfrm>
+            <a:off x="6909810" y="3966189"/>
+            <a:ext cx="2261899" cy="544852"/>
+          </a:xfrm>
+          <a:prstGeom prst="rect">
+            <a:avLst/>
+          </a:prstGeom>
+          <a:solidFill>
+            <a:srgbClr val="C10C06"/>
+          </a:solidFill>
+          <a:ln>
+            <a:noFill/>
+          </a:ln>
+        </p:spPr>
+        <p:style>
+          <a:lnRef idx="2">
+            <a:schemeClr val="accent1">
+              <a:shade val="50000"/>
+            </a:schemeClr>
+          </a:lnRef>
+          <a:fillRef idx="1">
+            <a:schemeClr val="accent1"/>
+          </a:fillRef>
+          <a:effectRef idx="0">
+            <a:schemeClr val="accent1"/>
+          </a:effectRef>
+          <a:fontRef idx="minor">
+            <a:schemeClr val="lt1"/>
+          </a:fontRef>
+        </p:style>
+        <p:txBody>
+          <a:bodyPr rtlCol="0" anchor="ctr"/>
+          <a:lstStyle/>
+          <a:p>
+            <a:pPr algn="ctr"/>
+            <a:endParaRPr lang="en-GB" dirty="0"/>
+          </a:p>
+        </p:txBody>
+      </p:sp>
+      <p:pic>
+        <p:nvPicPr>
+          <p:cNvPr id="5" name="Picture 4">
+            <a:extLst>
+              <a:ext uri="{FF2B5EF4-FFF2-40B4-BE49-F238E27FC236}">
+                <a16:creationId xmlns:a16="http://schemas.microsoft.com/office/drawing/2014/main" id="{6AB5975D-A458-4F42-A9AF-165F7C8F2E8D}"/>
+              </a:ext>
+            </a:extLst>
+          </p:cNvPr>
+          <p:cNvPicPr>
+            <a:picLocks noChangeAspect="1"/>
+          </p:cNvPicPr>
+          <p:nvPr/>
+        </p:nvPicPr>
+        <p:blipFill>
+          <a:blip r:embed="rId3">
+            <a:clrChange>
+              <a:clrFrom>
+                <a:srgbClr val="000000">
+                  <a:alpha val="0"/>
+                </a:srgbClr>
+              </a:clrFrom>
+              <a:clrTo>
+                <a:srgbClr val="000000">
+                  <a:alpha val="0"/>
+                </a:srgbClr>
+              </a:clrTo>
+            </a:clrChange>
+          </a:blip>
+          <a:stretch>
+            <a:fillRect/>
+          </a:stretch>
+        </p:blipFill>
+        <p:spPr>
+          <a:xfrm>
+            <a:off x="7640709" y="3966189"/>
+            <a:ext cx="905507" cy="951606"/>
+          </a:xfrm>
+          <a:prstGeom prst="rect">
+            <a:avLst/>
+          </a:prstGeom>
+        </p:spPr>
+      </p:pic>
+    </p:spTree>
+    <p:extLst>
+      <p:ext uri="{BB962C8B-B14F-4D97-AF65-F5344CB8AC3E}">
+        <p14:creationId xmlns:p14="http://schemas.microsoft.com/office/powerpoint/2010/main" val="3046732424"/>
+      </p:ext>
+    </p:extLst>
+  </p:cSld>
+  <p:clrMapOvr>
+    <a:masterClrMapping/>
+  </p:clrMapOvr>
+</p:sld>
+</file>
+
+<file path=ppt/slides/slide4.xml><?xml version="1.0" encoding="utf-8"?>
+<p:sld xmlns:a="http://schemas.openxmlformats.org/drawingml/2006/main" xmlns:r="http://schemas.openxmlformats.org/officeDocument/2006/relationships" xmlns:p="http://schemas.openxmlformats.org/presentationml/2006/main">
+  <p:cSld>
+    <p:spTree>
+      <p:nvGrpSpPr>
+        <p:cNvPr id="1" name=""/>
+        <p:cNvGrpSpPr/>
+        <p:nvPr/>
+      </p:nvGrpSpPr>
+      <p:grpSpPr>
+        <a:xfrm>
+          <a:off x="0" y="0"/>
+          <a:ext cx="0" cy="0"/>
+          <a:chOff x="0" y="0"/>
+          <a:chExt cx="0" cy="0"/>
+        </a:xfrm>
+      </p:grpSpPr>
+      <p:pic>
+        <p:nvPicPr>
+          <p:cNvPr id="2" name="Picture 1">
+            <a:extLst>
+              <a:ext uri="{FF2B5EF4-FFF2-40B4-BE49-F238E27FC236}">
                 <a16:creationId xmlns:a16="http://schemas.microsoft.com/office/drawing/2014/main" id="{B46493AC-AE8F-4B91-8C0D-0D185605539A}"/>
               </a:ext>
             </a:extLst>
@@ -5242,7 +5466,7 @@
 </p:sld>
 </file>
 
-<file path=ppt/slides/slide4.xml><?xml version="1.0" encoding="utf-8"?>
+<file path=ppt/slides/slide5.xml><?xml version="1.0" encoding="utf-8"?>
 <p:sld xmlns:a="http://schemas.openxmlformats.org/drawingml/2006/main" xmlns:r="http://schemas.openxmlformats.org/officeDocument/2006/relationships" xmlns:p="http://schemas.openxmlformats.org/presentationml/2006/main">
   <p:cSld>
     <p:spTree>

</xml_diff>

<commit_message>
Typo in Change Log; New "Keep Calm" image
</commit_message>
<xml_diff>
--- a/cleverdict.pptx
+++ b/cleverdict.pptx
@@ -119,7 +119,7 @@
 <file path=ppt/revisionInfo.xml><?xml version="1.0" encoding="utf-8"?>
 <p1510:revInfo xmlns:a="http://schemas.openxmlformats.org/drawingml/2006/main" xmlns:r="http://schemas.openxmlformats.org/officeDocument/2006/relationships" xmlns:p1510="http://schemas.microsoft.com/office/powerpoint/2015/10/main">
   <p1510:revLst>
-    <p1510:client id="{A4CD6E9A-18C3-4F43-9F4A-6EB9A7A6C9AA}" v="29" dt="2021-01-28T02:23:10.292"/>
+    <p1510:client id="{A4CD6E9A-18C3-4F43-9F4A-6EB9A7A6C9AA}" v="36" dt="2021-01-30T02:35:31.483"/>
   </p1510:revLst>
 </p1510:revInfo>
 </file>
@@ -129,10 +129,56 @@
   <pc:docChgLst>
     <pc:chgData name="Peter Fison" userId="414d6edd842eada8" providerId="LiveId" clId="{A4CD6E9A-18C3-4F43-9F4A-6EB9A7A6C9AA}"/>
     <pc:docChg chg="undo custSel addSld delSld modSld sldOrd">
-      <pc:chgData name="Peter Fison" userId="414d6edd842eada8" providerId="LiveId" clId="{A4CD6E9A-18C3-4F43-9F4A-6EB9A7A6C9AA}" dt="2021-01-28T02:27:06.395" v="657" actId="732"/>
+      <pc:chgData name="Peter Fison" userId="414d6edd842eada8" providerId="LiveId" clId="{A4CD6E9A-18C3-4F43-9F4A-6EB9A7A6C9AA}" dt="2021-01-30T02:35:34.319" v="734" actId="1076"/>
       <pc:docMkLst>
         <pc:docMk/>
       </pc:docMkLst>
+      <pc:sldChg chg="addSp modSp mod">
+        <pc:chgData name="Peter Fison" userId="414d6edd842eada8" providerId="LiveId" clId="{A4CD6E9A-18C3-4F43-9F4A-6EB9A7A6C9AA}" dt="2021-01-30T02:26:47.564" v="710" actId="207"/>
+        <pc:sldMkLst>
+          <pc:docMk/>
+          <pc:sldMk cId="1956321584" sldId="256"/>
+        </pc:sldMkLst>
+        <pc:spChg chg="mod">
+          <ac:chgData name="Peter Fison" userId="414d6edd842eada8" providerId="LiveId" clId="{A4CD6E9A-18C3-4F43-9F4A-6EB9A7A6C9AA}" dt="2021-01-30T02:18:01.194" v="661" actId="1076"/>
+          <ac:spMkLst>
+            <pc:docMk/>
+            <pc:sldMk cId="1956321584" sldId="256"/>
+            <ac:spMk id="2" creationId="{2FE32AD5-0611-4B8F-98F4-C3475424A8C0}"/>
+          </ac:spMkLst>
+        </pc:spChg>
+        <pc:spChg chg="add mod">
+          <ac:chgData name="Peter Fison" userId="414d6edd842eada8" providerId="LiveId" clId="{A4CD6E9A-18C3-4F43-9F4A-6EB9A7A6C9AA}" dt="2021-01-30T02:23:35.051" v="685" actId="1076"/>
+          <ac:spMkLst>
+            <pc:docMk/>
+            <pc:sldMk cId="1956321584" sldId="256"/>
+            <ac:spMk id="5" creationId="{B0CE6CA6-1677-456A-9883-D994A7E830F4}"/>
+          </ac:spMkLst>
+        </pc:spChg>
+        <pc:spChg chg="add mod">
+          <ac:chgData name="Peter Fison" userId="414d6edd842eada8" providerId="LiveId" clId="{A4CD6E9A-18C3-4F43-9F4A-6EB9A7A6C9AA}" dt="2021-01-30T02:26:47.564" v="710" actId="207"/>
+          <ac:spMkLst>
+            <pc:docMk/>
+            <pc:sldMk cId="1956321584" sldId="256"/>
+            <ac:spMk id="15" creationId="{FF0A3DE1-40C4-4EE3-8B2D-7ECD78EA3654}"/>
+          </ac:spMkLst>
+        </pc:spChg>
+      </pc:sldChg>
+      <pc:sldChg chg="addSp modSp mod">
+        <pc:chgData name="Peter Fison" userId="414d6edd842eada8" providerId="LiveId" clId="{A4CD6E9A-18C3-4F43-9F4A-6EB9A7A6C9AA}" dt="2021-01-30T02:23:54.815" v="687" actId="1076"/>
+        <pc:sldMkLst>
+          <pc:docMk/>
+          <pc:sldMk cId="239817303" sldId="257"/>
+        </pc:sldMkLst>
+        <pc:picChg chg="add mod">
+          <ac:chgData name="Peter Fison" userId="414d6edd842eada8" providerId="LiveId" clId="{A4CD6E9A-18C3-4F43-9F4A-6EB9A7A6C9AA}" dt="2021-01-30T02:23:54.815" v="687" actId="1076"/>
+          <ac:picMkLst>
+            <pc:docMk/>
+            <pc:sldMk cId="239817303" sldId="257"/>
+            <ac:picMk id="3" creationId="{74F19EEE-5A3E-4938-AD77-4EBCE3B0F938}"/>
+          </ac:picMkLst>
+        </pc:picChg>
+      </pc:sldChg>
       <pc:sldChg chg="addSp delSp modSp new del mod">
         <pc:chgData name="Peter Fison" userId="414d6edd842eada8" providerId="LiveId" clId="{A4CD6E9A-18C3-4F43-9F4A-6EB9A7A6C9AA}" dt="2021-01-24T14:32:12.825" v="446" actId="47"/>
         <pc:sldMkLst>
@@ -423,18 +469,34 @@
           </ac:picMkLst>
         </pc:picChg>
       </pc:sldChg>
-      <pc:sldChg chg="addSp modSp new mod">
-        <pc:chgData name="Peter Fison" userId="414d6edd842eada8" providerId="LiveId" clId="{A4CD6E9A-18C3-4F43-9F4A-6EB9A7A6C9AA}" dt="2021-01-28T02:27:06.395" v="657" actId="732"/>
+      <pc:sldChg chg="addSp delSp modSp new mod">
+        <pc:chgData name="Peter Fison" userId="414d6edd842eada8" providerId="LiveId" clId="{A4CD6E9A-18C3-4F43-9F4A-6EB9A7A6C9AA}" dt="2021-01-30T02:35:34.319" v="734" actId="1076"/>
         <pc:sldMkLst>
           <pc:docMk/>
           <pc:sldMk cId="3046732424" sldId="264"/>
         </pc:sldMkLst>
         <pc:spChg chg="add mod">
-          <ac:chgData name="Peter Fison" userId="414d6edd842eada8" providerId="LiveId" clId="{A4CD6E9A-18C3-4F43-9F4A-6EB9A7A6C9AA}" dt="2021-01-28T02:23:02.298" v="648" actId="1076"/>
+          <ac:chgData name="Peter Fison" userId="414d6edd842eada8" providerId="LiveId" clId="{A4CD6E9A-18C3-4F43-9F4A-6EB9A7A6C9AA}" dt="2021-01-30T02:27:35.477" v="718" actId="1076"/>
           <ac:spMkLst>
             <pc:docMk/>
             <pc:sldMk cId="3046732424" sldId="264"/>
             <ac:spMk id="4" creationId="{7ABAE0A7-D1C5-477E-875A-9E9B534916A1}"/>
+          </ac:spMkLst>
+        </pc:spChg>
+        <pc:spChg chg="add mod ord">
+          <ac:chgData name="Peter Fison" userId="414d6edd842eada8" providerId="LiveId" clId="{A4CD6E9A-18C3-4F43-9F4A-6EB9A7A6C9AA}" dt="2021-01-30T02:27:35.477" v="718" actId="1076"/>
+          <ac:spMkLst>
+            <pc:docMk/>
+            <pc:sldMk cId="3046732424" sldId="264"/>
+            <ac:spMk id="7" creationId="{E2DA78DD-7532-4753-B522-122595D8EC69}"/>
+          </ac:spMkLst>
+        </pc:spChg>
+        <pc:spChg chg="add mod">
+          <ac:chgData name="Peter Fison" userId="414d6edd842eada8" providerId="LiveId" clId="{A4CD6E9A-18C3-4F43-9F4A-6EB9A7A6C9AA}" dt="2021-01-30T02:35:24.301" v="732" actId="1076"/>
+          <ac:spMkLst>
+            <pc:docMk/>
+            <pc:sldMk cId="3046732424" sldId="264"/>
+            <ac:spMk id="8" creationId="{03BFEB2E-20B5-4B23-8CA2-29B26DC6D02E}"/>
           </ac:spMkLst>
         </pc:spChg>
         <pc:picChg chg="add mod modCrop">
@@ -445,22 +507,54 @@
             <ac:picMk id="2" creationId="{9EFFD346-73CB-43BE-949E-01E4D3A0663E}"/>
           </ac:picMkLst>
         </pc:picChg>
-        <pc:picChg chg="add mod">
-          <ac:chgData name="Peter Fison" userId="414d6edd842eada8" providerId="LiveId" clId="{A4CD6E9A-18C3-4F43-9F4A-6EB9A7A6C9AA}" dt="2021-01-28T02:22:35.789" v="642" actId="1076"/>
+        <pc:picChg chg="add mod modCrop">
+          <ac:chgData name="Peter Fison" userId="414d6edd842eada8" providerId="LiveId" clId="{A4CD6E9A-18C3-4F43-9F4A-6EB9A7A6C9AA}" dt="2021-01-30T02:27:35.477" v="718" actId="1076"/>
           <ac:picMkLst>
             <pc:docMk/>
             <pc:sldMk cId="3046732424" sldId="264"/>
             <ac:picMk id="3" creationId="{C3FC64B9-AC87-4376-AD9C-BEBA106FA23C}"/>
           </ac:picMkLst>
         </pc:picChg>
-        <pc:picChg chg="add mod">
-          <ac:chgData name="Peter Fison" userId="414d6edd842eada8" providerId="LiveId" clId="{A4CD6E9A-18C3-4F43-9F4A-6EB9A7A6C9AA}" dt="2021-01-28T02:23:21.910" v="651" actId="1076"/>
+        <pc:picChg chg="add del mod">
+          <ac:chgData name="Peter Fison" userId="414d6edd842eada8" providerId="LiveId" clId="{A4CD6E9A-18C3-4F43-9F4A-6EB9A7A6C9AA}" dt="2021-01-30T02:24:02.340" v="688" actId="478"/>
           <ac:picMkLst>
             <pc:docMk/>
             <pc:sldMk cId="3046732424" sldId="264"/>
             <ac:picMk id="5" creationId="{6AB5975D-A458-4F42-A9AF-165F7C8F2E8D}"/>
           </ac:picMkLst>
         </pc:picChg>
+        <pc:picChg chg="add mod modCrop">
+          <ac:chgData name="Peter Fison" userId="414d6edd842eada8" providerId="LiveId" clId="{A4CD6E9A-18C3-4F43-9F4A-6EB9A7A6C9AA}" dt="2021-01-30T02:33:21.050" v="724" actId="1076"/>
+          <ac:picMkLst>
+            <pc:docMk/>
+            <pc:sldMk cId="3046732424" sldId="264"/>
+            <ac:picMk id="6" creationId="{CDE93497-9579-488B-8310-6A287ACB95CA}"/>
+          </ac:picMkLst>
+        </pc:picChg>
+        <pc:picChg chg="add del mod">
+          <ac:chgData name="Peter Fison" userId="414d6edd842eada8" providerId="LiveId" clId="{A4CD6E9A-18C3-4F43-9F4A-6EB9A7A6C9AA}" dt="2021-01-30T02:33:30.056" v="726" actId="478"/>
+          <ac:picMkLst>
+            <pc:docMk/>
+            <pc:sldMk cId="3046732424" sldId="264"/>
+            <ac:picMk id="9" creationId="{00D68F1F-AAB4-46EA-AA04-57B813FE1CB0}"/>
+          </ac:picMkLst>
+        </pc:picChg>
+        <pc:picChg chg="add mod">
+          <ac:chgData name="Peter Fison" userId="414d6edd842eada8" providerId="LiveId" clId="{A4CD6E9A-18C3-4F43-9F4A-6EB9A7A6C9AA}" dt="2021-01-30T02:35:34.319" v="734" actId="1076"/>
+          <ac:picMkLst>
+            <pc:docMk/>
+            <pc:sldMk cId="3046732424" sldId="264"/>
+            <ac:picMk id="12" creationId="{A468D070-8D81-486D-970F-8C6ED80E645E}"/>
+          </ac:picMkLst>
+        </pc:picChg>
+        <pc:cxnChg chg="add del mod">
+          <ac:chgData name="Peter Fison" userId="414d6edd842eada8" providerId="LiveId" clId="{A4CD6E9A-18C3-4F43-9F4A-6EB9A7A6C9AA}" dt="2021-01-30T02:33:32.793" v="727" actId="478"/>
+          <ac:cxnSpMkLst>
+            <pc:docMk/>
+            <pc:sldMk cId="3046732424" sldId="264"/>
+            <ac:cxnSpMk id="11" creationId="{A75AA5B1-D637-4DDA-9453-4F0E2ACC5E8E}"/>
+          </ac:cxnSpMkLst>
+        </pc:cxnChg>
       </pc:sldChg>
     </pc:docChg>
   </pc:docChgLst>
@@ -743,7 +837,7 @@
           <a:p>
             <a:fld id="{2CE7C7E5-49C6-4B10-A40B-9FC62228FE97}" type="datetimeFigureOut">
               <a:rPr lang="en-GB" smtClean="0"/>
-              <a:t>28/01/2021</a:t>
+              <a:t>30/01/2021</a:t>
             </a:fld>
             <a:endParaRPr lang="en-GB"/>
           </a:p>
@@ -943,7 +1037,7 @@
           <a:p>
             <a:fld id="{2CE7C7E5-49C6-4B10-A40B-9FC62228FE97}" type="datetimeFigureOut">
               <a:rPr lang="en-GB" smtClean="0"/>
-              <a:t>28/01/2021</a:t>
+              <a:t>30/01/2021</a:t>
             </a:fld>
             <a:endParaRPr lang="en-GB"/>
           </a:p>
@@ -1153,7 +1247,7 @@
           <a:p>
             <a:fld id="{2CE7C7E5-49C6-4B10-A40B-9FC62228FE97}" type="datetimeFigureOut">
               <a:rPr lang="en-GB" smtClean="0"/>
-              <a:t>28/01/2021</a:t>
+              <a:t>30/01/2021</a:t>
             </a:fld>
             <a:endParaRPr lang="en-GB"/>
           </a:p>
@@ -1353,7 +1447,7 @@
           <a:p>
             <a:fld id="{2CE7C7E5-49C6-4B10-A40B-9FC62228FE97}" type="datetimeFigureOut">
               <a:rPr lang="en-GB" smtClean="0"/>
-              <a:t>28/01/2021</a:t>
+              <a:t>30/01/2021</a:t>
             </a:fld>
             <a:endParaRPr lang="en-GB"/>
           </a:p>
@@ -1629,7 +1723,7 @@
           <a:p>
             <a:fld id="{2CE7C7E5-49C6-4B10-A40B-9FC62228FE97}" type="datetimeFigureOut">
               <a:rPr lang="en-GB" smtClean="0"/>
-              <a:t>28/01/2021</a:t>
+              <a:t>30/01/2021</a:t>
             </a:fld>
             <a:endParaRPr lang="en-GB"/>
           </a:p>
@@ -1897,7 +1991,7 @@
           <a:p>
             <a:fld id="{2CE7C7E5-49C6-4B10-A40B-9FC62228FE97}" type="datetimeFigureOut">
               <a:rPr lang="en-GB" smtClean="0"/>
-              <a:t>28/01/2021</a:t>
+              <a:t>30/01/2021</a:t>
             </a:fld>
             <a:endParaRPr lang="en-GB"/>
           </a:p>
@@ -2312,7 +2406,7 @@
           <a:p>
             <a:fld id="{2CE7C7E5-49C6-4B10-A40B-9FC62228FE97}" type="datetimeFigureOut">
               <a:rPr lang="en-GB" smtClean="0"/>
-              <a:t>28/01/2021</a:t>
+              <a:t>30/01/2021</a:t>
             </a:fld>
             <a:endParaRPr lang="en-GB"/>
           </a:p>
@@ -2454,7 +2548,7 @@
           <a:p>
             <a:fld id="{2CE7C7E5-49C6-4B10-A40B-9FC62228FE97}" type="datetimeFigureOut">
               <a:rPr lang="en-GB" smtClean="0"/>
-              <a:t>28/01/2021</a:t>
+              <a:t>30/01/2021</a:t>
             </a:fld>
             <a:endParaRPr lang="en-GB"/>
           </a:p>
@@ -2567,7 +2661,7 @@
           <a:p>
             <a:fld id="{2CE7C7E5-49C6-4B10-A40B-9FC62228FE97}" type="datetimeFigureOut">
               <a:rPr lang="en-GB" smtClean="0"/>
-              <a:t>28/01/2021</a:t>
+              <a:t>30/01/2021</a:t>
             </a:fld>
             <a:endParaRPr lang="en-GB"/>
           </a:p>
@@ -2880,7 +2974,7 @@
           <a:p>
             <a:fld id="{2CE7C7E5-49C6-4B10-A40B-9FC62228FE97}" type="datetimeFigureOut">
               <a:rPr lang="en-GB" smtClean="0"/>
-              <a:t>28/01/2021</a:t>
+              <a:t>30/01/2021</a:t>
             </a:fld>
             <a:endParaRPr lang="en-GB"/>
           </a:p>
@@ -3169,7 +3263,7 @@
           <a:p>
             <a:fld id="{2CE7C7E5-49C6-4B10-A40B-9FC62228FE97}" type="datetimeFigureOut">
               <a:rPr lang="en-GB" smtClean="0"/>
-              <a:t>28/01/2021</a:t>
+              <a:t>30/01/2021</a:t>
             </a:fld>
             <a:endParaRPr lang="en-GB"/>
           </a:p>
@@ -3412,7 +3506,7 @@
           <a:p>
             <a:fld id="{2CE7C7E5-49C6-4B10-A40B-9FC62228FE97}" type="datetimeFigureOut">
               <a:rPr lang="en-GB" smtClean="0"/>
-              <a:t>28/01/2021</a:t>
+              <a:t>30/01/2021</a:t>
             </a:fld>
             <a:endParaRPr lang="en-GB"/>
           </a:p>
@@ -4630,6 +4724,112 @@
           </a:p>
         </p:txBody>
       </p:sp>
+      <p:sp>
+        <p:nvSpPr>
+          <p:cNvPr id="5" name="TextBox 4">
+            <a:extLst>
+              <a:ext uri="{FF2B5EF4-FFF2-40B4-BE49-F238E27FC236}">
+                <a16:creationId xmlns:a16="http://schemas.microsoft.com/office/drawing/2014/main" id="{B0CE6CA6-1677-456A-9883-D994A7E830F4}"/>
+              </a:ext>
+            </a:extLst>
+          </p:cNvPr>
+          <p:cNvSpPr txBox="1"/>
+          <p:nvPr/>
+        </p:nvSpPr>
+        <p:spPr>
+          <a:xfrm>
+            <a:off x="5336770" y="3814733"/>
+            <a:ext cx="2904962" cy="769441"/>
+          </a:xfrm>
+          <a:prstGeom prst="rect">
+            <a:avLst/>
+          </a:prstGeom>
+          <a:noFill/>
+        </p:spPr>
+        <p:txBody>
+          <a:bodyPr wrap="none" rtlCol="0">
+            <a:spAutoFit/>
+          </a:bodyPr>
+          <a:lstStyle/>
+          <a:p>
+            <a:r>
+              <a:rPr lang="en-GB" sz="4400" b="1" dirty="0" err="1">
+                <a:solidFill>
+                  <a:srgbClr val="0077BB"/>
+                </a:solidFill>
+                <a:latin typeface="Kozuka Gothic Pro H" panose="020B0800000000000000" pitchFamily="34" charset="-128"/>
+                <a:ea typeface="Kozuka Gothic Pro H" panose="020B0800000000000000" pitchFamily="34" charset="-128"/>
+              </a:rPr>
+              <a:t>Clever</a:t>
+            </a:r>
+            <a:r>
+              <a:rPr lang="en-GB" sz="4400" b="1" dirty="0" err="1">
+                <a:solidFill>
+                  <a:srgbClr val="FEC106"/>
+                </a:solidFill>
+                <a:latin typeface="Kozuka Gothic Pro H" panose="020B0800000000000000" pitchFamily="34" charset="-128"/>
+                <a:ea typeface="Kozuka Gothic Pro H" panose="020B0800000000000000" pitchFamily="34" charset="-128"/>
+              </a:rPr>
+              <a:t>Dict</a:t>
+            </a:r>
+            <a:endParaRPr lang="en-GB" sz="4400" b="1" dirty="0">
+              <a:solidFill>
+                <a:srgbClr val="FEC106"/>
+              </a:solidFill>
+              <a:latin typeface="Kozuka Gothic Pro H" panose="020B0800000000000000" pitchFamily="34" charset="-128"/>
+              <a:ea typeface="Kozuka Gothic Pro H" panose="020B0800000000000000" pitchFamily="34" charset="-128"/>
+            </a:endParaRPr>
+          </a:p>
+        </p:txBody>
+      </p:sp>
+      <p:sp>
+        <p:nvSpPr>
+          <p:cNvPr id="15" name="TextBox 14">
+            <a:extLst>
+              <a:ext uri="{FF2B5EF4-FFF2-40B4-BE49-F238E27FC236}">
+                <a16:creationId xmlns:a16="http://schemas.microsoft.com/office/drawing/2014/main" id="{FF0A3DE1-40C4-4EE3-8B2D-7ECD78EA3654}"/>
+              </a:ext>
+            </a:extLst>
+          </p:cNvPr>
+          <p:cNvSpPr txBox="1"/>
+          <p:nvPr/>
+        </p:nvSpPr>
+        <p:spPr>
+          <a:xfrm>
+            <a:off x="8823246" y="2383887"/>
+            <a:ext cx="2904962" cy="769441"/>
+          </a:xfrm>
+          <a:prstGeom prst="rect">
+            <a:avLst/>
+          </a:prstGeom>
+          <a:noFill/>
+        </p:spPr>
+        <p:txBody>
+          <a:bodyPr wrap="none" rtlCol="0">
+            <a:spAutoFit/>
+          </a:bodyPr>
+          <a:lstStyle/>
+          <a:p>
+            <a:r>
+              <a:rPr lang="en-GB" sz="4400" b="1" dirty="0" err="1">
+                <a:solidFill>
+                  <a:schemeClr val="bg1"/>
+                </a:solidFill>
+                <a:latin typeface="Kozuka Gothic Pro H" panose="020B0800000000000000" pitchFamily="34" charset="-128"/>
+                <a:ea typeface="Kozuka Gothic Pro H" panose="020B0800000000000000" pitchFamily="34" charset="-128"/>
+              </a:rPr>
+              <a:t>CleverDict</a:t>
+            </a:r>
+            <a:endParaRPr lang="en-GB" sz="4400" b="1" dirty="0">
+              <a:solidFill>
+                <a:schemeClr val="bg1"/>
+              </a:solidFill>
+              <a:latin typeface="Kozuka Gothic Pro H" panose="020B0800000000000000" pitchFamily="34" charset="-128"/>
+              <a:ea typeface="Kozuka Gothic Pro H" panose="020B0800000000000000" pitchFamily="34" charset="-128"/>
+            </a:endParaRPr>
+          </a:p>
+        </p:txBody>
+      </p:sp>
     </p:spTree>
     <p:extLst>
       <p:ext uri="{BB962C8B-B14F-4D97-AF65-F5344CB8AC3E}">
@@ -4737,6 +4937,36 @@
           <a:xfrm>
             <a:off x="5257727" y="2548051"/>
             <a:ext cx="1676545" cy="1761897"/>
+          </a:xfrm>
+          <a:prstGeom prst="rect">
+            <a:avLst/>
+          </a:prstGeom>
+        </p:spPr>
+      </p:pic>
+      <p:pic>
+        <p:nvPicPr>
+          <p:cNvPr id="3" name="Picture 2">
+            <a:extLst>
+              <a:ext uri="{FF2B5EF4-FFF2-40B4-BE49-F238E27FC236}">
+                <a16:creationId xmlns:a16="http://schemas.microsoft.com/office/drawing/2014/main" id="{74F19EEE-5A3E-4938-AD77-4EBCE3B0F938}"/>
+              </a:ext>
+            </a:extLst>
+          </p:cNvPr>
+          <p:cNvPicPr>
+            <a:picLocks noChangeAspect="1"/>
+          </p:cNvPicPr>
+          <p:nvPr/>
+        </p:nvPicPr>
+        <p:blipFill>
+          <a:blip r:embed="rId4"/>
+          <a:stretch>
+            <a:fillRect/>
+          </a:stretch>
+        </p:blipFill>
+        <p:spPr>
+          <a:xfrm>
+            <a:off x="8214490" y="2117680"/>
+            <a:ext cx="3377477" cy="2877561"/>
           </a:xfrm>
           <a:prstGeom prst="rect">
             <a:avLst/>
@@ -4773,6 +5003,58 @@
           <a:chExt cx="0" cy="0"/>
         </a:xfrm>
       </p:grpSpPr>
+      <p:sp>
+        <p:nvSpPr>
+          <p:cNvPr id="7" name="Rectangle 6">
+            <a:extLst>
+              <a:ext uri="{FF2B5EF4-FFF2-40B4-BE49-F238E27FC236}">
+                <a16:creationId xmlns:a16="http://schemas.microsoft.com/office/drawing/2014/main" id="{E2DA78DD-7532-4753-B522-122595D8EC69}"/>
+              </a:ext>
+            </a:extLst>
+          </p:cNvPr>
+          <p:cNvSpPr/>
+          <p:nvPr/>
+        </p:nvSpPr>
+        <p:spPr>
+          <a:xfrm>
+            <a:off x="4904509" y="1169325"/>
+            <a:ext cx="3253048" cy="4655158"/>
+          </a:xfrm>
+          <a:prstGeom prst="rect">
+            <a:avLst/>
+          </a:prstGeom>
+          <a:solidFill>
+            <a:srgbClr val="C10C06"/>
+          </a:solidFill>
+          <a:ln>
+            <a:noFill/>
+          </a:ln>
+        </p:spPr>
+        <p:style>
+          <a:lnRef idx="2">
+            <a:schemeClr val="accent1">
+              <a:shade val="50000"/>
+            </a:schemeClr>
+          </a:lnRef>
+          <a:fillRef idx="1">
+            <a:schemeClr val="accent1"/>
+          </a:fillRef>
+          <a:effectRef idx="0">
+            <a:schemeClr val="accent1"/>
+          </a:effectRef>
+          <a:fontRef idx="minor">
+            <a:schemeClr val="lt1"/>
+          </a:fontRef>
+        </p:style>
+        <p:txBody>
+          <a:bodyPr rtlCol="0" anchor="ctr"/>
+          <a:lstStyle/>
+          <a:p>
+            <a:pPr algn="ctr"/>
+            <a:endParaRPr lang="en-GB"/>
+          </a:p>
+        </p:txBody>
+      </p:sp>
       <p:pic>
         <p:nvPicPr>
           <p:cNvPr id="2" name="Picture 1">
@@ -4816,16 +5098,15 @@
           </p:cNvPicPr>
           <p:nvPr/>
         </p:nvPicPr>
-        <p:blipFill>
+        <p:blipFill rotWithShape="1">
           <a:blip r:embed="rId2"/>
-          <a:stretch>
-            <a:fillRect/>
-          </a:stretch>
+          <a:srcRect l="20014" t="17757" r="17198" b="29519"/>
+          <a:stretch/>
         </p:blipFill>
         <p:spPr>
           <a:xfrm>
-            <a:off x="5646474" y="695667"/>
-            <a:ext cx="4572000" cy="4572000"/>
+            <a:off x="5109556" y="1391147"/>
+            <a:ext cx="2870663" cy="2410540"/>
           </a:xfrm>
           <a:prstGeom prst="rect">
             <a:avLst/>
@@ -4846,7 +5127,7 @@
         </p:nvSpPr>
         <p:spPr>
           <a:xfrm>
-            <a:off x="6909810" y="3966189"/>
+            <a:off x="5457854" y="3849811"/>
             <a:ext cx="2261899" cy="544852"/>
           </a:xfrm>
           <a:prstGeom prst="rect">
@@ -4886,10 +5167,87 @@
       </p:sp>
       <p:pic>
         <p:nvPicPr>
-          <p:cNvPr id="5" name="Picture 4">
-            <a:extLst>
-              <a:ext uri="{FF2B5EF4-FFF2-40B4-BE49-F238E27FC236}">
-                <a16:creationId xmlns:a16="http://schemas.microsoft.com/office/drawing/2014/main" id="{6AB5975D-A458-4F42-A9AF-165F7C8F2E8D}"/>
+          <p:cNvPr id="6" name="Picture 5">
+            <a:extLst>
+              <a:ext uri="{FF2B5EF4-FFF2-40B4-BE49-F238E27FC236}">
+                <a16:creationId xmlns:a16="http://schemas.microsoft.com/office/drawing/2014/main" id="{CDE93497-9579-488B-8310-6A287ACB95CA}"/>
+              </a:ext>
+            </a:extLst>
+          </p:cNvPr>
+          <p:cNvPicPr>
+            <a:picLocks noChangeAspect="1"/>
+          </p:cNvPicPr>
+          <p:nvPr/>
+        </p:nvPicPr>
+        <p:blipFill rotWithShape="1">
+          <a:blip r:embed="rId3"/>
+          <a:srcRect b="36778"/>
+          <a:stretch/>
+        </p:blipFill>
+        <p:spPr>
+          <a:xfrm>
+            <a:off x="5533133" y="3962029"/>
+            <a:ext cx="2122423" cy="1143224"/>
+          </a:xfrm>
+          <a:prstGeom prst="rect">
+            <a:avLst/>
+          </a:prstGeom>
+        </p:spPr>
+      </p:pic>
+      <p:sp>
+        <p:nvSpPr>
+          <p:cNvPr id="8" name="TextBox 7">
+            <a:extLst>
+              <a:ext uri="{FF2B5EF4-FFF2-40B4-BE49-F238E27FC236}">
+                <a16:creationId xmlns:a16="http://schemas.microsoft.com/office/drawing/2014/main" id="{03BFEB2E-20B5-4B23-8CA2-29B26DC6D02E}"/>
+              </a:ext>
+            </a:extLst>
+          </p:cNvPr>
+          <p:cNvSpPr txBox="1"/>
+          <p:nvPr/>
+        </p:nvSpPr>
+        <p:spPr>
+          <a:xfrm>
+            <a:off x="5424680" y="5065657"/>
+            <a:ext cx="2401619" cy="584775"/>
+          </a:xfrm>
+          <a:prstGeom prst="rect">
+            <a:avLst/>
+          </a:prstGeom>
+          <a:noFill/>
+        </p:spPr>
+        <p:txBody>
+          <a:bodyPr wrap="none" rtlCol="0">
+            <a:spAutoFit/>
+          </a:bodyPr>
+          <a:lstStyle/>
+          <a:p>
+            <a:r>
+              <a:rPr lang="en-GB" sz="3200" b="1" dirty="0" err="1">
+                <a:solidFill>
+                  <a:schemeClr val="bg1"/>
+                </a:solidFill>
+                <a:latin typeface="Montserrat Alternates SemiBold" panose="00000700000000000000" pitchFamily="50" charset="0"/>
+                <a:ea typeface="Kozuka Gothic Pro H" panose="020B0800000000000000" pitchFamily="34" charset="-128"/>
+              </a:rPr>
+              <a:t>CleverDict</a:t>
+            </a:r>
+            <a:endParaRPr lang="en-GB" sz="3200" b="1" dirty="0">
+              <a:solidFill>
+                <a:schemeClr val="bg1"/>
+              </a:solidFill>
+              <a:latin typeface="Montserrat Alternates SemiBold" panose="00000700000000000000" pitchFamily="50" charset="0"/>
+              <a:ea typeface="Kozuka Gothic Pro H" panose="020B0800000000000000" pitchFamily="34" charset="-128"/>
+            </a:endParaRPr>
+          </a:p>
+        </p:txBody>
+      </p:sp>
+      <p:pic>
+        <p:nvPicPr>
+          <p:cNvPr id="12" name="Picture 11">
+            <a:extLst>
+              <a:ext uri="{FF2B5EF4-FFF2-40B4-BE49-F238E27FC236}">
+                <a16:creationId xmlns:a16="http://schemas.microsoft.com/office/drawing/2014/main" id="{A468D070-8D81-486D-970F-8C6ED80E645E}"/>
               </a:ext>
             </a:extLst>
           </p:cNvPr>
@@ -4899,28 +5257,15 @@
           <p:nvPr/>
         </p:nvPicPr>
         <p:blipFill>
-          <a:blip r:embed="rId3">
-            <a:clrChange>
-              <a:clrFrom>
-                <a:srgbClr val="000000">
-                  <a:alpha val="0"/>
-                </a:srgbClr>
-              </a:clrFrom>
-              <a:clrTo>
-                <a:srgbClr val="000000">
-                  <a:alpha val="0"/>
-                </a:srgbClr>
-              </a:clrTo>
-            </a:clrChange>
-          </a:blip>
+          <a:blip r:embed="rId4"/>
           <a:stretch>
             <a:fillRect/>
           </a:stretch>
         </p:blipFill>
         <p:spPr>
           <a:xfrm>
-            <a:off x="7640709" y="3966189"/>
-            <a:ext cx="905507" cy="951606"/>
+            <a:off x="8533564" y="1090981"/>
+            <a:ext cx="3249450" cy="4676037"/>
           </a:xfrm>
           <a:prstGeom prst="rect">
             <a:avLst/>

</xml_diff>